<commit_message>
Añadida botonera. CompOK, DebugX
Arreglado OUTPUT pinMode... no declarados
Actualizada PPT.
No probado sobre placa
</commit_message>
<xml_diff>
--- a/Esquemas.pptx
+++ b/Esquemas.pptx
@@ -203,7 +203,7 @@
           <a:p>
             <a:fld id="{84E491CA-4C85-4BB4-A669-85C5A56232AC}" type="datetimeFigureOut">
               <a:rPr lang="es-ES" smtClean="0"/>
-              <a:t>02/03/2023</a:t>
+              <a:t>03/03/2023</a:t>
             </a:fld>
             <a:endParaRPr lang="es-ES"/>
           </a:p>
@@ -869,7 +869,7 @@
           <a:p>
             <a:fld id="{769901B9-84E4-4E1C-A6F5-333C66875601}" type="datetimeFigureOut">
               <a:rPr lang="es-ES" smtClean="0"/>
-              <a:t>02/03/2023</a:t>
+              <a:t>03/03/2023</a:t>
             </a:fld>
             <a:endParaRPr lang="es-ES"/>
           </a:p>
@@ -1067,7 +1067,7 @@
           <a:p>
             <a:fld id="{769901B9-84E4-4E1C-A6F5-333C66875601}" type="datetimeFigureOut">
               <a:rPr lang="es-ES" smtClean="0"/>
-              <a:t>02/03/2023</a:t>
+              <a:t>03/03/2023</a:t>
             </a:fld>
             <a:endParaRPr lang="es-ES"/>
           </a:p>
@@ -1275,7 +1275,7 @@
           <a:p>
             <a:fld id="{769901B9-84E4-4E1C-A6F5-333C66875601}" type="datetimeFigureOut">
               <a:rPr lang="es-ES" smtClean="0"/>
-              <a:t>02/03/2023</a:t>
+              <a:t>03/03/2023</a:t>
             </a:fld>
             <a:endParaRPr lang="es-ES"/>
           </a:p>
@@ -1473,7 +1473,7 @@
           <a:p>
             <a:fld id="{769901B9-84E4-4E1C-A6F5-333C66875601}" type="datetimeFigureOut">
               <a:rPr lang="es-ES" smtClean="0"/>
-              <a:t>02/03/2023</a:t>
+              <a:t>03/03/2023</a:t>
             </a:fld>
             <a:endParaRPr lang="es-ES"/>
           </a:p>
@@ -1748,7 +1748,7 @@
           <a:p>
             <a:fld id="{769901B9-84E4-4E1C-A6F5-333C66875601}" type="datetimeFigureOut">
               <a:rPr lang="es-ES" smtClean="0"/>
-              <a:t>02/03/2023</a:t>
+              <a:t>03/03/2023</a:t>
             </a:fld>
             <a:endParaRPr lang="es-ES"/>
           </a:p>
@@ -2013,7 +2013,7 @@
           <a:p>
             <a:fld id="{769901B9-84E4-4E1C-A6F5-333C66875601}" type="datetimeFigureOut">
               <a:rPr lang="es-ES" smtClean="0"/>
-              <a:t>02/03/2023</a:t>
+              <a:t>03/03/2023</a:t>
             </a:fld>
             <a:endParaRPr lang="es-ES"/>
           </a:p>
@@ -2425,7 +2425,7 @@
           <a:p>
             <a:fld id="{769901B9-84E4-4E1C-A6F5-333C66875601}" type="datetimeFigureOut">
               <a:rPr lang="es-ES" smtClean="0"/>
-              <a:t>02/03/2023</a:t>
+              <a:t>03/03/2023</a:t>
             </a:fld>
             <a:endParaRPr lang="es-ES"/>
           </a:p>
@@ -2566,7 +2566,7 @@
           <a:p>
             <a:fld id="{769901B9-84E4-4E1C-A6F5-333C66875601}" type="datetimeFigureOut">
               <a:rPr lang="es-ES" smtClean="0"/>
-              <a:t>02/03/2023</a:t>
+              <a:t>03/03/2023</a:t>
             </a:fld>
             <a:endParaRPr lang="es-ES"/>
           </a:p>
@@ -2679,7 +2679,7 @@
           <a:p>
             <a:fld id="{769901B9-84E4-4E1C-A6F5-333C66875601}" type="datetimeFigureOut">
               <a:rPr lang="es-ES" smtClean="0"/>
-              <a:t>02/03/2023</a:t>
+              <a:t>03/03/2023</a:t>
             </a:fld>
             <a:endParaRPr lang="es-ES"/>
           </a:p>
@@ -2990,7 +2990,7 @@
           <a:p>
             <a:fld id="{769901B9-84E4-4E1C-A6F5-333C66875601}" type="datetimeFigureOut">
               <a:rPr lang="es-ES" smtClean="0"/>
-              <a:t>02/03/2023</a:t>
+              <a:t>03/03/2023</a:t>
             </a:fld>
             <a:endParaRPr lang="es-ES"/>
           </a:p>
@@ -3278,7 +3278,7 @@
           <a:p>
             <a:fld id="{769901B9-84E4-4E1C-A6F5-333C66875601}" type="datetimeFigureOut">
               <a:rPr lang="es-ES" smtClean="0"/>
-              <a:t>02/03/2023</a:t>
+              <a:t>03/03/2023</a:t>
             </a:fld>
             <a:endParaRPr lang="es-ES"/>
           </a:p>
@@ -3519,7 +3519,7 @@
           <a:p>
             <a:fld id="{769901B9-84E4-4E1C-A6F5-333C66875601}" type="datetimeFigureOut">
               <a:rPr lang="es-ES" smtClean="0"/>
-              <a:t>02/03/2023</a:t>
+              <a:t>03/03/2023</a:t>
             </a:fld>
             <a:endParaRPr lang="es-ES"/>
           </a:p>
@@ -3938,6 +3938,101 @@
       </p:grpSpPr>
       <p:sp>
         <p:nvSpPr>
+          <p:cNvPr id="10" name="Rectángulo 9">
+            <a:extLst>
+              <a:ext uri="{FF2B5EF4-FFF2-40B4-BE49-F238E27FC236}">
+                <a16:creationId xmlns:a16="http://schemas.microsoft.com/office/drawing/2014/main" id="{50A65899-B62F-63B9-A088-CE10CBAA5FD2}"/>
+              </a:ext>
+            </a:extLst>
+          </p:cNvPr>
+          <p:cNvSpPr/>
+          <p:nvPr/>
+        </p:nvSpPr>
+        <p:spPr>
+          <a:xfrm>
+            <a:off x="1552057" y="4443864"/>
+            <a:ext cx="1762383" cy="931355"/>
+          </a:xfrm>
+          <a:prstGeom prst="rect">
+            <a:avLst/>
+          </a:prstGeom>
+          <a:ln>
+            <a:prstDash val="dash"/>
+          </a:ln>
+        </p:spPr>
+        <p:style>
+          <a:lnRef idx="2">
+            <a:schemeClr val="dk1"/>
+          </a:lnRef>
+          <a:fillRef idx="1">
+            <a:schemeClr val="lt1"/>
+          </a:fillRef>
+          <a:effectRef idx="0">
+            <a:schemeClr val="dk1"/>
+          </a:effectRef>
+          <a:fontRef idx="minor">
+            <a:schemeClr val="dk1"/>
+          </a:fontRef>
+        </p:style>
+        <p:txBody>
+          <a:bodyPr rtlCol="0" anchor="ctr"/>
+          <a:lstStyle/>
+          <a:p>
+            <a:pPr algn="ctr"/>
+            <a:endParaRPr lang="es-ES"/>
+          </a:p>
+        </p:txBody>
+      </p:sp>
+      <p:sp>
+        <p:nvSpPr>
+          <p:cNvPr id="31" name="Rectángulo 30">
+            <a:extLst>
+              <a:ext uri="{FF2B5EF4-FFF2-40B4-BE49-F238E27FC236}">
+                <a16:creationId xmlns:a16="http://schemas.microsoft.com/office/drawing/2014/main" id="{93C10682-6285-7323-8B6B-7B4C92891872}"/>
+              </a:ext>
+            </a:extLst>
+          </p:cNvPr>
+          <p:cNvSpPr/>
+          <p:nvPr/>
+        </p:nvSpPr>
+        <p:spPr>
+          <a:xfrm>
+            <a:off x="2356367" y="4689838"/>
+            <a:ext cx="699149" cy="497805"/>
+          </a:xfrm>
+          <a:prstGeom prst="rect">
+            <a:avLst/>
+          </a:prstGeom>
+          <a:ln>
+            <a:headEnd type="none" w="med" len="med"/>
+            <a:tailEnd type="none" w="med" len="med"/>
+          </a:ln>
+        </p:spPr>
+        <p:style>
+          <a:lnRef idx="2">
+            <a:schemeClr val="dk1"/>
+          </a:lnRef>
+          <a:fillRef idx="1">
+            <a:schemeClr val="lt1"/>
+          </a:fillRef>
+          <a:effectRef idx="0">
+            <a:schemeClr val="dk1"/>
+          </a:effectRef>
+          <a:fontRef idx="minor">
+            <a:schemeClr val="dk1"/>
+          </a:fontRef>
+        </p:style>
+        <p:txBody>
+          <a:bodyPr rtlCol="0" anchor="ctr"/>
+          <a:lstStyle/>
+          <a:p>
+            <a:pPr algn="ctr"/>
+            <a:endParaRPr lang="es-ES"/>
+          </a:p>
+        </p:txBody>
+      </p:sp>
+      <p:sp>
+        <p:nvSpPr>
           <p:cNvPr id="4" name="Rectángulo 3">
             <a:extLst>
               <a:ext uri="{FF2B5EF4-FFF2-40B4-BE49-F238E27FC236}">
@@ -4199,8 +4294,8 @@
         </p:nvSpPr>
         <p:spPr>
           <a:xfrm>
-            <a:off x="5706022" y="999341"/>
-            <a:ext cx="764798" cy="467682"/>
+            <a:off x="5706022" y="1026925"/>
+            <a:ext cx="764798" cy="382947"/>
           </a:xfrm>
           <a:prstGeom prst="rect">
             <a:avLst/>
@@ -4292,8 +4387,8 @@
         </p:nvCxnSpPr>
         <p:spPr>
           <a:xfrm flipV="1">
-            <a:off x="6088421" y="354786"/>
-            <a:ext cx="0" cy="644555"/>
+            <a:off x="6088421" y="297636"/>
+            <a:ext cx="0" cy="729289"/>
           </a:xfrm>
           <a:prstGeom prst="line">
             <a:avLst/>
@@ -4324,6 +4419,7 @@
             </a:extLst>
           </p:cNvPr>
           <p:cNvCxnSpPr>
+            <a:cxnSpLocks/>
             <a:stCxn id="26" idx="2"/>
             <a:endCxn id="21" idx="0"/>
           </p:cNvCxnSpPr>
@@ -4331,8 +4427,8 @@
         </p:nvCxnSpPr>
         <p:spPr>
           <a:xfrm>
-            <a:off x="6088421" y="1467023"/>
-            <a:ext cx="0" cy="336610"/>
+            <a:off x="6088421" y="1409872"/>
+            <a:ext cx="0" cy="393761"/>
           </a:xfrm>
           <a:prstGeom prst="line">
             <a:avLst/>
@@ -4364,618 +4460,13 @@
           </p:cNvPr>
           <p:cNvCxnSpPr>
             <a:cxnSpLocks/>
-            <a:stCxn id="4" idx="0"/>
           </p:cNvCxnSpPr>
           <p:nvPr/>
         </p:nvCxnSpPr>
         <p:spPr>
-          <a:xfrm flipH="1" flipV="1">
-            <a:off x="4378014" y="685218"/>
-            <a:ext cx="6496" cy="314124"/>
-          </a:xfrm>
-          <a:prstGeom prst="line">
-            <a:avLst/>
-          </a:prstGeom>
-        </p:spPr>
-        <p:style>
-          <a:lnRef idx="1">
-            <a:schemeClr val="dk1"/>
-          </a:lnRef>
-          <a:fillRef idx="0">
-            <a:schemeClr val="dk1"/>
-          </a:fillRef>
-          <a:effectRef idx="0">
-            <a:schemeClr val="dk1"/>
-          </a:effectRef>
-          <a:fontRef idx="minor">
-            <a:schemeClr val="tx1"/>
-          </a:fontRef>
-        </p:style>
-      </p:cxnSp>
-      <p:cxnSp>
-        <p:nvCxnSpPr>
-          <p:cNvPr id="49" name="Conector recto 48">
-            <a:extLst>
-              <a:ext uri="{FF2B5EF4-FFF2-40B4-BE49-F238E27FC236}">
-                <a16:creationId xmlns:a16="http://schemas.microsoft.com/office/drawing/2014/main" id="{816BAEA7-4E6C-D47F-0361-54E5BBF6745A}"/>
-              </a:ext>
-            </a:extLst>
-          </p:cNvPr>
-          <p:cNvCxnSpPr>
-            <a:cxnSpLocks/>
-          </p:cNvCxnSpPr>
-          <p:nvPr/>
-        </p:nvCxnSpPr>
-        <p:spPr>
-          <a:xfrm flipH="1">
-            <a:off x="4359913" y="5666853"/>
-            <a:ext cx="6496" cy="523001"/>
-          </a:xfrm>
-          <a:prstGeom prst="line">
-            <a:avLst/>
-          </a:prstGeom>
-        </p:spPr>
-        <p:style>
-          <a:lnRef idx="1">
-            <a:schemeClr val="dk1"/>
-          </a:lnRef>
-          <a:fillRef idx="0">
-            <a:schemeClr val="dk1"/>
-          </a:fillRef>
-          <a:effectRef idx="0">
-            <a:schemeClr val="dk1"/>
-          </a:effectRef>
-          <a:fontRef idx="minor">
-            <a:schemeClr val="tx1"/>
-          </a:fontRef>
-        </p:style>
-      </p:cxnSp>
-      <p:cxnSp>
-        <p:nvCxnSpPr>
-          <p:cNvPr id="51" name="Conector recto 50">
-            <a:extLst>
-              <a:ext uri="{FF2B5EF4-FFF2-40B4-BE49-F238E27FC236}">
-                <a16:creationId xmlns:a16="http://schemas.microsoft.com/office/drawing/2014/main" id="{CCEF24CF-F079-543C-ECCE-0C78678CD859}"/>
-              </a:ext>
-            </a:extLst>
-          </p:cNvPr>
-          <p:cNvCxnSpPr>
-            <a:cxnSpLocks/>
-          </p:cNvCxnSpPr>
-          <p:nvPr/>
-        </p:nvCxnSpPr>
-        <p:spPr>
-          <a:xfrm>
-            <a:off x="4835668" y="3101392"/>
-            <a:ext cx="2200448" cy="0"/>
-          </a:xfrm>
-          <a:prstGeom prst="line">
-            <a:avLst/>
-          </a:prstGeom>
-        </p:spPr>
-        <p:style>
-          <a:lnRef idx="1">
-            <a:schemeClr val="dk1"/>
-          </a:lnRef>
-          <a:fillRef idx="0">
-            <a:schemeClr val="dk1"/>
-          </a:fillRef>
-          <a:effectRef idx="0">
-            <a:schemeClr val="dk1"/>
-          </a:effectRef>
-          <a:fontRef idx="minor">
-            <a:schemeClr val="tx1"/>
-          </a:fontRef>
-        </p:style>
-      </p:cxnSp>
-      <p:sp>
-        <p:nvSpPr>
-          <p:cNvPr id="53" name="Rectángulo 52">
-            <a:extLst>
-              <a:ext uri="{FF2B5EF4-FFF2-40B4-BE49-F238E27FC236}">
-                <a16:creationId xmlns:a16="http://schemas.microsoft.com/office/drawing/2014/main" id="{1975F5E3-F85B-1D5E-83C1-8AC01A63E4DD}"/>
-              </a:ext>
-            </a:extLst>
-          </p:cNvPr>
-          <p:cNvSpPr/>
-          <p:nvPr/>
-        </p:nvSpPr>
-        <p:spPr>
-          <a:xfrm>
-            <a:off x="6310817" y="2852351"/>
-            <a:ext cx="764798" cy="467682"/>
-          </a:xfrm>
-          <a:prstGeom prst="rect">
-            <a:avLst/>
-          </a:prstGeom>
-        </p:spPr>
-        <p:style>
-          <a:lnRef idx="2">
-            <a:schemeClr val="dk1"/>
-          </a:lnRef>
-          <a:fillRef idx="1">
-            <a:schemeClr val="lt1"/>
-          </a:fillRef>
-          <a:effectRef idx="0">
-            <a:schemeClr val="dk1"/>
-          </a:effectRef>
-          <a:fontRef idx="minor">
-            <a:schemeClr val="dk1"/>
-          </a:fontRef>
-        </p:style>
-        <p:txBody>
-          <a:bodyPr rtlCol="0" anchor="ctr"/>
-          <a:lstStyle/>
-          <a:p>
-            <a:pPr algn="ctr"/>
-            <a:r>
-              <a:rPr lang="es-ES" dirty="0" err="1"/>
-              <a:t>Sens</a:t>
-            </a:r>
-            <a:r>
-              <a:rPr lang="es-ES" dirty="0"/>
-              <a:t>. Luz</a:t>
-            </a:r>
-          </a:p>
-        </p:txBody>
-      </p:sp>
-      <p:cxnSp>
-        <p:nvCxnSpPr>
-          <p:cNvPr id="56" name="Conector recto 55">
-            <a:extLst>
-              <a:ext uri="{FF2B5EF4-FFF2-40B4-BE49-F238E27FC236}">
-                <a16:creationId xmlns:a16="http://schemas.microsoft.com/office/drawing/2014/main" id="{A3277509-86B4-F8E1-7380-A2DABBA3DDE0}"/>
-              </a:ext>
-            </a:extLst>
-          </p:cNvPr>
-          <p:cNvCxnSpPr>
-            <a:cxnSpLocks/>
-            <a:stCxn id="53" idx="2"/>
-          </p:cNvCxnSpPr>
-          <p:nvPr/>
-        </p:nvCxnSpPr>
-        <p:spPr>
-          <a:xfrm>
-            <a:off x="6693216" y="3320033"/>
-            <a:ext cx="0" cy="2889218"/>
-          </a:xfrm>
-          <a:prstGeom prst="line">
-            <a:avLst/>
-          </a:prstGeom>
-        </p:spPr>
-        <p:style>
-          <a:lnRef idx="1">
-            <a:schemeClr val="dk1"/>
-          </a:lnRef>
-          <a:fillRef idx="0">
-            <a:schemeClr val="dk1"/>
-          </a:fillRef>
-          <a:effectRef idx="0">
-            <a:schemeClr val="dk1"/>
-          </a:effectRef>
-          <a:fontRef idx="minor">
-            <a:schemeClr val="tx1"/>
-          </a:fontRef>
-        </p:style>
-      </p:cxnSp>
-      <p:cxnSp>
-        <p:nvCxnSpPr>
-          <p:cNvPr id="62" name="Conector recto 61">
-            <a:extLst>
-              <a:ext uri="{FF2B5EF4-FFF2-40B4-BE49-F238E27FC236}">
-                <a16:creationId xmlns:a16="http://schemas.microsoft.com/office/drawing/2014/main" id="{8D5EBEA8-A3E4-B7A9-0151-145A0C3A33FE}"/>
-              </a:ext>
-            </a:extLst>
-          </p:cNvPr>
-          <p:cNvCxnSpPr>
-            <a:cxnSpLocks/>
-            <a:stCxn id="53" idx="0"/>
-          </p:cNvCxnSpPr>
-          <p:nvPr/>
-        </p:nvCxnSpPr>
-        <p:spPr>
           <a:xfrm flipV="1">
-            <a:off x="6693216" y="662730"/>
-            <a:ext cx="0" cy="2189621"/>
-          </a:xfrm>
-          <a:prstGeom prst="line">
-            <a:avLst/>
-          </a:prstGeom>
-        </p:spPr>
-        <p:style>
-          <a:lnRef idx="1">
-            <a:schemeClr val="dk1"/>
-          </a:lnRef>
-          <a:fillRef idx="0">
-            <a:schemeClr val="dk1"/>
-          </a:fillRef>
-          <a:effectRef idx="0">
-            <a:schemeClr val="dk1"/>
-          </a:effectRef>
-          <a:fontRef idx="minor">
-            <a:schemeClr val="tx1"/>
-          </a:fontRef>
-        </p:style>
-      </p:cxnSp>
-      <p:sp>
-        <p:nvSpPr>
-          <p:cNvPr id="68" name="CuadroTexto 67">
-            <a:extLst>
-              <a:ext uri="{FF2B5EF4-FFF2-40B4-BE49-F238E27FC236}">
-                <a16:creationId xmlns:a16="http://schemas.microsoft.com/office/drawing/2014/main" id="{6D7D2849-C76A-4F21-2B34-D65D08903707}"/>
-              </a:ext>
-            </a:extLst>
-          </p:cNvPr>
-          <p:cNvSpPr txBox="1"/>
-          <p:nvPr/>
-        </p:nvSpPr>
-        <p:spPr>
-          <a:xfrm>
-            <a:off x="10260782" y="0"/>
-            <a:ext cx="1973505" cy="369332"/>
-          </a:xfrm>
-          <a:prstGeom prst="rect">
-            <a:avLst/>
-          </a:prstGeom>
-          <a:noFill/>
-        </p:spPr>
-        <p:txBody>
-          <a:bodyPr wrap="square" rtlCol="0">
-            <a:spAutoFit/>
-          </a:bodyPr>
-          <a:lstStyle/>
-          <a:p>
-            <a:r>
-              <a:rPr lang="es-ES" dirty="0"/>
-              <a:t>Bus Principal - 12 V</a:t>
-            </a:r>
-          </a:p>
-        </p:txBody>
-      </p:sp>
-      <p:sp>
-        <p:nvSpPr>
-          <p:cNvPr id="69" name="CuadroTexto 68">
-            <a:extLst>
-              <a:ext uri="{FF2B5EF4-FFF2-40B4-BE49-F238E27FC236}">
-                <a16:creationId xmlns:a16="http://schemas.microsoft.com/office/drawing/2014/main" id="{232AFDF0-89C4-69B3-C269-BBD09B806075}"/>
-              </a:ext>
-            </a:extLst>
-          </p:cNvPr>
-          <p:cNvSpPr txBox="1"/>
-          <p:nvPr/>
-        </p:nvSpPr>
-        <p:spPr>
-          <a:xfrm>
-            <a:off x="11256889" y="354786"/>
-            <a:ext cx="1076586" cy="369332"/>
-          </a:xfrm>
-          <a:prstGeom prst="rect">
-            <a:avLst/>
-          </a:prstGeom>
-          <a:noFill/>
-        </p:spPr>
-        <p:txBody>
-          <a:bodyPr wrap="square" rtlCol="0">
-            <a:spAutoFit/>
-          </a:bodyPr>
-          <a:lstStyle/>
-          <a:p>
-            <a:r>
-              <a:rPr lang="es-ES" dirty="0">
-                <a:highlight>
-                  <a:srgbClr val="FF0000"/>
-                </a:highlight>
-              </a:rPr>
-              <a:t>5 – </a:t>
-            </a:r>
-            <a:r>
-              <a:rPr lang="es-ES" dirty="0"/>
-              <a:t>3.3 V</a:t>
-            </a:r>
-          </a:p>
-        </p:txBody>
-      </p:sp>
-      <p:cxnSp>
-        <p:nvCxnSpPr>
-          <p:cNvPr id="82" name="Conector recto 81">
-            <a:extLst>
-              <a:ext uri="{FF2B5EF4-FFF2-40B4-BE49-F238E27FC236}">
-                <a16:creationId xmlns:a16="http://schemas.microsoft.com/office/drawing/2014/main" id="{DB5CB874-6D6D-D57A-E3A6-F10600230A0B}"/>
-              </a:ext>
-            </a:extLst>
-          </p:cNvPr>
-          <p:cNvCxnSpPr>
-            <a:cxnSpLocks/>
-          </p:cNvCxnSpPr>
-          <p:nvPr/>
-        </p:nvCxnSpPr>
-        <p:spPr>
-          <a:xfrm flipV="1">
-            <a:off x="9484211" y="354786"/>
-            <a:ext cx="0" cy="4575692"/>
-          </a:xfrm>
-          <a:prstGeom prst="line">
-            <a:avLst/>
-          </a:prstGeom>
-        </p:spPr>
-        <p:style>
-          <a:lnRef idx="1">
-            <a:schemeClr val="dk1"/>
-          </a:lnRef>
-          <a:fillRef idx="0">
-            <a:schemeClr val="dk1"/>
-          </a:fillRef>
-          <a:effectRef idx="0">
-            <a:schemeClr val="dk1"/>
-          </a:effectRef>
-          <a:fontRef idx="minor">
-            <a:schemeClr val="tx1"/>
-          </a:fontRef>
-        </p:style>
-      </p:cxnSp>
-      <p:cxnSp>
-        <p:nvCxnSpPr>
-          <p:cNvPr id="87" name="Conector recto 86">
-            <a:extLst>
-              <a:ext uri="{FF2B5EF4-FFF2-40B4-BE49-F238E27FC236}">
-                <a16:creationId xmlns:a16="http://schemas.microsoft.com/office/drawing/2014/main" id="{C368847F-0D3A-FD7D-B1F0-B681AC6B786C}"/>
-              </a:ext>
-            </a:extLst>
-          </p:cNvPr>
-          <p:cNvCxnSpPr>
-            <a:cxnSpLocks/>
-            <a:stCxn id="3" idx="2"/>
-          </p:cNvCxnSpPr>
-          <p:nvPr/>
-        </p:nvCxnSpPr>
-        <p:spPr>
-          <a:xfrm flipH="1">
-            <a:off x="4845020" y="5085649"/>
-            <a:ext cx="4372638" cy="0"/>
-          </a:xfrm>
-          <a:prstGeom prst="line">
-            <a:avLst/>
-          </a:prstGeom>
-        </p:spPr>
-        <p:style>
-          <a:lnRef idx="1">
-            <a:schemeClr val="dk1"/>
-          </a:lnRef>
-          <a:fillRef idx="0">
-            <a:schemeClr val="dk1"/>
-          </a:fillRef>
-          <a:effectRef idx="0">
-            <a:schemeClr val="dk1"/>
-          </a:effectRef>
-          <a:fontRef idx="minor">
-            <a:schemeClr val="tx1"/>
-          </a:fontRef>
-        </p:style>
-      </p:cxnSp>
-      <p:sp>
-        <p:nvSpPr>
-          <p:cNvPr id="92" name="CuadroTexto 91">
-            <a:extLst>
-              <a:ext uri="{FF2B5EF4-FFF2-40B4-BE49-F238E27FC236}">
-                <a16:creationId xmlns:a16="http://schemas.microsoft.com/office/drawing/2014/main" id="{D0702F18-EEBE-7226-EBCE-0B72D71C5AFC}"/>
-              </a:ext>
-            </a:extLst>
-          </p:cNvPr>
-          <p:cNvSpPr txBox="1"/>
-          <p:nvPr/>
-        </p:nvSpPr>
-        <p:spPr>
-          <a:xfrm>
-            <a:off x="4511334" y="2978281"/>
-            <a:ext cx="447378" cy="246221"/>
-          </a:xfrm>
-          <a:prstGeom prst="rect">
-            <a:avLst/>
-          </a:prstGeom>
-          <a:noFill/>
-        </p:spPr>
-        <p:txBody>
-          <a:bodyPr wrap="square" rtlCol="0">
-            <a:spAutoFit/>
-          </a:bodyPr>
-          <a:lstStyle/>
-          <a:p>
-            <a:r>
-              <a:rPr lang="es-ES" sz="1000" dirty="0"/>
-              <a:t>ADC</a:t>
-            </a:r>
-          </a:p>
-        </p:txBody>
-      </p:sp>
-      <p:sp>
-        <p:nvSpPr>
-          <p:cNvPr id="94" name="CuadroTexto 93">
-            <a:extLst>
-              <a:ext uri="{FF2B5EF4-FFF2-40B4-BE49-F238E27FC236}">
-                <a16:creationId xmlns:a16="http://schemas.microsoft.com/office/drawing/2014/main" id="{1CA4BEC4-34B2-1003-72F5-2E0301196F44}"/>
-              </a:ext>
-            </a:extLst>
-          </p:cNvPr>
-          <p:cNvSpPr txBox="1"/>
-          <p:nvPr/>
-        </p:nvSpPr>
-        <p:spPr>
-          <a:xfrm>
-            <a:off x="4329954" y="1966987"/>
-            <a:ext cx="473121" cy="400110"/>
-          </a:xfrm>
-          <a:prstGeom prst="rect">
-            <a:avLst/>
-          </a:prstGeom>
-          <a:noFill/>
-        </p:spPr>
-        <p:txBody>
-          <a:bodyPr wrap="square" rtlCol="0">
-            <a:spAutoFit/>
-          </a:bodyPr>
-          <a:lstStyle/>
-          <a:p>
-            <a:r>
-              <a:rPr lang="es-ES" sz="1000" dirty="0"/>
-              <a:t>DO1</a:t>
-            </a:r>
-          </a:p>
-          <a:p>
-            <a:r>
-              <a:rPr lang="es-ES" sz="1000" dirty="0"/>
-              <a:t>PWM</a:t>
-            </a:r>
-          </a:p>
-        </p:txBody>
-      </p:sp>
-      <p:sp>
-        <p:nvSpPr>
-          <p:cNvPr id="98" name="Rectángulo 97">
-            <a:extLst>
-              <a:ext uri="{FF2B5EF4-FFF2-40B4-BE49-F238E27FC236}">
-                <a16:creationId xmlns:a16="http://schemas.microsoft.com/office/drawing/2014/main" id="{80683197-A762-2517-9F4F-BE6BBD91D85F}"/>
-              </a:ext>
-            </a:extLst>
-          </p:cNvPr>
-          <p:cNvSpPr/>
-          <p:nvPr/>
-        </p:nvSpPr>
-        <p:spPr>
-          <a:xfrm>
-            <a:off x="90432" y="2705799"/>
-            <a:ext cx="996410" cy="1276525"/>
-          </a:xfrm>
-          <a:prstGeom prst="rect">
-            <a:avLst/>
-          </a:prstGeom>
-        </p:spPr>
-        <p:style>
-          <a:lnRef idx="2">
-            <a:schemeClr val="dk1"/>
-          </a:lnRef>
-          <a:fillRef idx="1">
-            <a:schemeClr val="lt1"/>
-          </a:fillRef>
-          <a:effectRef idx="0">
-            <a:schemeClr val="dk1"/>
-          </a:effectRef>
-          <a:fontRef idx="minor">
-            <a:schemeClr val="dk1"/>
-          </a:fontRef>
-        </p:style>
-        <p:txBody>
-          <a:bodyPr rtlCol="0" anchor="ctr"/>
-          <a:lstStyle/>
-          <a:p>
-            <a:pPr algn="ctr"/>
-            <a:r>
-              <a:rPr lang="es-ES" dirty="0"/>
-              <a:t>REG BUCK</a:t>
-            </a:r>
-          </a:p>
-          <a:p>
-            <a:pPr algn="ctr"/>
-            <a:r>
-              <a:rPr lang="es-ES" dirty="0"/>
-              <a:t>5 V</a:t>
-            </a:r>
-          </a:p>
-        </p:txBody>
-      </p:sp>
-      <p:cxnSp>
-        <p:nvCxnSpPr>
-          <p:cNvPr id="100" name="Conector recto 99">
-            <a:extLst>
-              <a:ext uri="{FF2B5EF4-FFF2-40B4-BE49-F238E27FC236}">
-                <a16:creationId xmlns:a16="http://schemas.microsoft.com/office/drawing/2014/main" id="{4012D88E-636F-5FEB-0E6D-7956BE109480}"/>
-              </a:ext>
-            </a:extLst>
-          </p:cNvPr>
-          <p:cNvCxnSpPr>
-            <a:cxnSpLocks/>
-          </p:cNvCxnSpPr>
-          <p:nvPr/>
-        </p:nvCxnSpPr>
-        <p:spPr>
-          <a:xfrm flipV="1">
-            <a:off x="773195" y="345347"/>
-            <a:ext cx="0" cy="2360452"/>
-          </a:xfrm>
-          <a:prstGeom prst="line">
-            <a:avLst/>
-          </a:prstGeom>
-        </p:spPr>
-        <p:style>
-          <a:lnRef idx="1">
-            <a:schemeClr val="dk1"/>
-          </a:lnRef>
-          <a:fillRef idx="0">
-            <a:schemeClr val="dk1"/>
-          </a:fillRef>
-          <a:effectRef idx="0">
-            <a:schemeClr val="dk1"/>
-          </a:effectRef>
-          <a:fontRef idx="minor">
-            <a:schemeClr val="tx1"/>
-          </a:fontRef>
-        </p:style>
-      </p:cxnSp>
-      <p:cxnSp>
-        <p:nvCxnSpPr>
-          <p:cNvPr id="105" name="Conector recto 104">
-            <a:extLst>
-              <a:ext uri="{FF2B5EF4-FFF2-40B4-BE49-F238E27FC236}">
-                <a16:creationId xmlns:a16="http://schemas.microsoft.com/office/drawing/2014/main" id="{6560C847-387F-0B76-B387-512CF228A27B}"/>
-              </a:ext>
-            </a:extLst>
-          </p:cNvPr>
-          <p:cNvCxnSpPr>
-            <a:cxnSpLocks/>
-          </p:cNvCxnSpPr>
-          <p:nvPr/>
-        </p:nvCxnSpPr>
-        <p:spPr>
-          <a:xfrm>
-            <a:off x="588637" y="3982324"/>
-            <a:ext cx="0" cy="2226927"/>
-          </a:xfrm>
-          <a:prstGeom prst="line">
-            <a:avLst/>
-          </a:prstGeom>
-        </p:spPr>
-        <p:style>
-          <a:lnRef idx="1">
-            <a:schemeClr val="dk1"/>
-          </a:lnRef>
-          <a:fillRef idx="0">
-            <a:schemeClr val="dk1"/>
-          </a:fillRef>
-          <a:effectRef idx="0">
-            <a:schemeClr val="dk1"/>
-          </a:effectRef>
-          <a:fontRef idx="minor">
-            <a:schemeClr val="tx1"/>
-          </a:fontRef>
-        </p:style>
-      </p:cxnSp>
-      <p:cxnSp>
-        <p:nvCxnSpPr>
-          <p:cNvPr id="114" name="Conector recto 113">
-            <a:extLst>
-              <a:ext uri="{FF2B5EF4-FFF2-40B4-BE49-F238E27FC236}">
-                <a16:creationId xmlns:a16="http://schemas.microsoft.com/office/drawing/2014/main" id="{B2095BD1-8DF2-F87E-9BE9-F47659DA36C8}"/>
-              </a:ext>
-            </a:extLst>
-          </p:cNvPr>
-          <p:cNvCxnSpPr>
-            <a:cxnSpLocks/>
-          </p:cNvCxnSpPr>
-          <p:nvPr/>
-        </p:nvCxnSpPr>
-        <p:spPr>
-          <a:xfrm flipH="1">
-            <a:off x="1086842" y="2852351"/>
-            <a:ext cx="2864461" cy="0"/>
+            <a:off x="4384510" y="665765"/>
+            <a:ext cx="0" cy="428302"/>
           </a:xfrm>
           <a:prstGeom prst="line">
             <a:avLst/>
@@ -5001,6 +4492,601 @@
           </a:fontRef>
         </p:style>
       </p:cxnSp>
+      <p:cxnSp>
+        <p:nvCxnSpPr>
+          <p:cNvPr id="49" name="Conector recto 48">
+            <a:extLst>
+              <a:ext uri="{FF2B5EF4-FFF2-40B4-BE49-F238E27FC236}">
+                <a16:creationId xmlns:a16="http://schemas.microsoft.com/office/drawing/2014/main" id="{816BAEA7-4E6C-D47F-0361-54E5BBF6745A}"/>
+              </a:ext>
+            </a:extLst>
+          </p:cNvPr>
+          <p:cNvCxnSpPr>
+            <a:cxnSpLocks/>
+          </p:cNvCxnSpPr>
+          <p:nvPr/>
+        </p:nvCxnSpPr>
+        <p:spPr>
+          <a:xfrm flipH="1">
+            <a:off x="4359913" y="5666853"/>
+            <a:ext cx="6496" cy="523001"/>
+          </a:xfrm>
+          <a:prstGeom prst="line">
+            <a:avLst/>
+          </a:prstGeom>
+        </p:spPr>
+        <p:style>
+          <a:lnRef idx="1">
+            <a:schemeClr val="dk1"/>
+          </a:lnRef>
+          <a:fillRef idx="0">
+            <a:schemeClr val="dk1"/>
+          </a:fillRef>
+          <a:effectRef idx="0">
+            <a:schemeClr val="dk1"/>
+          </a:effectRef>
+          <a:fontRef idx="minor">
+            <a:schemeClr val="tx1"/>
+          </a:fontRef>
+        </p:style>
+      </p:cxnSp>
+      <p:cxnSp>
+        <p:nvCxnSpPr>
+          <p:cNvPr id="51" name="Conector recto 50">
+            <a:extLst>
+              <a:ext uri="{FF2B5EF4-FFF2-40B4-BE49-F238E27FC236}">
+                <a16:creationId xmlns:a16="http://schemas.microsoft.com/office/drawing/2014/main" id="{CCEF24CF-F079-543C-ECCE-0C78678CD859}"/>
+              </a:ext>
+            </a:extLst>
+          </p:cNvPr>
+          <p:cNvCxnSpPr>
+            <a:cxnSpLocks/>
+          </p:cNvCxnSpPr>
+          <p:nvPr/>
+        </p:nvCxnSpPr>
+        <p:spPr>
+          <a:xfrm>
+            <a:off x="4835668" y="3101392"/>
+            <a:ext cx="2200448" cy="0"/>
+          </a:xfrm>
+          <a:prstGeom prst="line">
+            <a:avLst/>
+          </a:prstGeom>
+        </p:spPr>
+        <p:style>
+          <a:lnRef idx="1">
+            <a:schemeClr val="dk1"/>
+          </a:lnRef>
+          <a:fillRef idx="0">
+            <a:schemeClr val="dk1"/>
+          </a:fillRef>
+          <a:effectRef idx="0">
+            <a:schemeClr val="dk1"/>
+          </a:effectRef>
+          <a:fontRef idx="minor">
+            <a:schemeClr val="tx1"/>
+          </a:fontRef>
+        </p:style>
+      </p:cxnSp>
+      <p:sp>
+        <p:nvSpPr>
+          <p:cNvPr id="53" name="Rectángulo 52">
+            <a:extLst>
+              <a:ext uri="{FF2B5EF4-FFF2-40B4-BE49-F238E27FC236}">
+                <a16:creationId xmlns:a16="http://schemas.microsoft.com/office/drawing/2014/main" id="{1975F5E3-F85B-1D5E-83C1-8AC01A63E4DD}"/>
+              </a:ext>
+            </a:extLst>
+          </p:cNvPr>
+          <p:cNvSpPr/>
+          <p:nvPr/>
+        </p:nvSpPr>
+        <p:spPr>
+          <a:xfrm>
+            <a:off x="6310817" y="2852351"/>
+            <a:ext cx="764798" cy="467682"/>
+          </a:xfrm>
+          <a:prstGeom prst="rect">
+            <a:avLst/>
+          </a:prstGeom>
+        </p:spPr>
+        <p:style>
+          <a:lnRef idx="2">
+            <a:schemeClr val="dk1"/>
+          </a:lnRef>
+          <a:fillRef idx="1">
+            <a:schemeClr val="lt1"/>
+          </a:fillRef>
+          <a:effectRef idx="0">
+            <a:schemeClr val="dk1"/>
+          </a:effectRef>
+          <a:fontRef idx="minor">
+            <a:schemeClr val="dk1"/>
+          </a:fontRef>
+        </p:style>
+        <p:txBody>
+          <a:bodyPr rtlCol="0" anchor="ctr"/>
+          <a:lstStyle/>
+          <a:p>
+            <a:pPr algn="ctr"/>
+            <a:r>
+              <a:rPr lang="es-ES" sz="1400" dirty="0" err="1"/>
+              <a:t>Sens</a:t>
+            </a:r>
+            <a:r>
+              <a:rPr lang="es-ES" sz="1400" dirty="0"/>
+              <a:t>. Luz</a:t>
+            </a:r>
+          </a:p>
+        </p:txBody>
+      </p:sp>
+      <p:cxnSp>
+        <p:nvCxnSpPr>
+          <p:cNvPr id="56" name="Conector recto 55">
+            <a:extLst>
+              <a:ext uri="{FF2B5EF4-FFF2-40B4-BE49-F238E27FC236}">
+                <a16:creationId xmlns:a16="http://schemas.microsoft.com/office/drawing/2014/main" id="{A3277509-86B4-F8E1-7380-A2DABBA3DDE0}"/>
+              </a:ext>
+            </a:extLst>
+          </p:cNvPr>
+          <p:cNvCxnSpPr>
+            <a:cxnSpLocks/>
+            <a:stCxn id="53" idx="2"/>
+          </p:cNvCxnSpPr>
+          <p:nvPr/>
+        </p:nvCxnSpPr>
+        <p:spPr>
+          <a:xfrm>
+            <a:off x="6693216" y="3320033"/>
+            <a:ext cx="0" cy="2889218"/>
+          </a:xfrm>
+          <a:prstGeom prst="line">
+            <a:avLst/>
+          </a:prstGeom>
+        </p:spPr>
+        <p:style>
+          <a:lnRef idx="1">
+            <a:schemeClr val="dk1"/>
+          </a:lnRef>
+          <a:fillRef idx="0">
+            <a:schemeClr val="dk1"/>
+          </a:fillRef>
+          <a:effectRef idx="0">
+            <a:schemeClr val="dk1"/>
+          </a:effectRef>
+          <a:fontRef idx="minor">
+            <a:schemeClr val="tx1"/>
+          </a:fontRef>
+        </p:style>
+      </p:cxnSp>
+      <p:cxnSp>
+        <p:nvCxnSpPr>
+          <p:cNvPr id="62" name="Conector recto 61">
+            <a:extLst>
+              <a:ext uri="{FF2B5EF4-FFF2-40B4-BE49-F238E27FC236}">
+                <a16:creationId xmlns:a16="http://schemas.microsoft.com/office/drawing/2014/main" id="{8D5EBEA8-A3E4-B7A9-0151-145A0C3A33FE}"/>
+              </a:ext>
+            </a:extLst>
+          </p:cNvPr>
+          <p:cNvCxnSpPr>
+            <a:cxnSpLocks/>
+            <a:stCxn id="53" idx="0"/>
+          </p:cNvCxnSpPr>
+          <p:nvPr/>
+        </p:nvCxnSpPr>
+        <p:spPr>
+          <a:xfrm flipV="1">
+            <a:off x="6693216" y="662730"/>
+            <a:ext cx="0" cy="2189621"/>
+          </a:xfrm>
+          <a:prstGeom prst="line">
+            <a:avLst/>
+          </a:prstGeom>
+        </p:spPr>
+        <p:style>
+          <a:lnRef idx="1">
+            <a:schemeClr val="dk1"/>
+          </a:lnRef>
+          <a:fillRef idx="0">
+            <a:schemeClr val="dk1"/>
+          </a:fillRef>
+          <a:effectRef idx="0">
+            <a:schemeClr val="dk1"/>
+          </a:effectRef>
+          <a:fontRef idx="minor">
+            <a:schemeClr val="tx1"/>
+          </a:fontRef>
+        </p:style>
+      </p:cxnSp>
+      <p:sp>
+        <p:nvSpPr>
+          <p:cNvPr id="68" name="CuadroTexto 67">
+            <a:extLst>
+              <a:ext uri="{FF2B5EF4-FFF2-40B4-BE49-F238E27FC236}">
+                <a16:creationId xmlns:a16="http://schemas.microsoft.com/office/drawing/2014/main" id="{6D7D2849-C76A-4F21-2B34-D65D08903707}"/>
+              </a:ext>
+            </a:extLst>
+          </p:cNvPr>
+          <p:cNvSpPr txBox="1"/>
+          <p:nvPr/>
+        </p:nvSpPr>
+        <p:spPr>
+          <a:xfrm>
+            <a:off x="10260782" y="0"/>
+            <a:ext cx="1973505" cy="369332"/>
+          </a:xfrm>
+          <a:prstGeom prst="rect">
+            <a:avLst/>
+          </a:prstGeom>
+          <a:noFill/>
+        </p:spPr>
+        <p:txBody>
+          <a:bodyPr wrap="square" rtlCol="0">
+            <a:spAutoFit/>
+          </a:bodyPr>
+          <a:lstStyle/>
+          <a:p>
+            <a:r>
+              <a:rPr lang="es-ES" dirty="0"/>
+              <a:t>Bus Potencia - 12 V</a:t>
+            </a:r>
+          </a:p>
+        </p:txBody>
+      </p:sp>
+      <p:sp>
+        <p:nvSpPr>
+          <p:cNvPr id="69" name="CuadroTexto 68">
+            <a:extLst>
+              <a:ext uri="{FF2B5EF4-FFF2-40B4-BE49-F238E27FC236}">
+                <a16:creationId xmlns:a16="http://schemas.microsoft.com/office/drawing/2014/main" id="{232AFDF0-89C4-69B3-C269-BBD09B806075}"/>
+              </a:ext>
+            </a:extLst>
+          </p:cNvPr>
+          <p:cNvSpPr txBox="1"/>
+          <p:nvPr/>
+        </p:nvSpPr>
+        <p:spPr>
+          <a:xfrm>
+            <a:off x="10424161" y="354786"/>
+            <a:ext cx="1909314" cy="369332"/>
+          </a:xfrm>
+          <a:prstGeom prst="rect">
+            <a:avLst/>
+          </a:prstGeom>
+          <a:noFill/>
+        </p:spPr>
+        <p:txBody>
+          <a:bodyPr wrap="square" rtlCol="0">
+            <a:spAutoFit/>
+          </a:bodyPr>
+          <a:lstStyle/>
+          <a:p>
+            <a:r>
+              <a:rPr lang="es-ES" dirty="0"/>
+              <a:t>Bus Control 3.3 V</a:t>
+            </a:r>
+          </a:p>
+        </p:txBody>
+      </p:sp>
+      <p:cxnSp>
+        <p:nvCxnSpPr>
+          <p:cNvPr id="82" name="Conector recto 81">
+            <a:extLst>
+              <a:ext uri="{FF2B5EF4-FFF2-40B4-BE49-F238E27FC236}">
+                <a16:creationId xmlns:a16="http://schemas.microsoft.com/office/drawing/2014/main" id="{DB5CB874-6D6D-D57A-E3A6-F10600230A0B}"/>
+              </a:ext>
+            </a:extLst>
+          </p:cNvPr>
+          <p:cNvCxnSpPr>
+            <a:cxnSpLocks/>
+          </p:cNvCxnSpPr>
+          <p:nvPr/>
+        </p:nvCxnSpPr>
+        <p:spPr>
+          <a:xfrm flipV="1">
+            <a:off x="9484211" y="354786"/>
+            <a:ext cx="0" cy="4575692"/>
+          </a:xfrm>
+          <a:prstGeom prst="line">
+            <a:avLst/>
+          </a:prstGeom>
+        </p:spPr>
+        <p:style>
+          <a:lnRef idx="1">
+            <a:schemeClr val="dk1"/>
+          </a:lnRef>
+          <a:fillRef idx="0">
+            <a:schemeClr val="dk1"/>
+          </a:fillRef>
+          <a:effectRef idx="0">
+            <a:schemeClr val="dk1"/>
+          </a:effectRef>
+          <a:fontRef idx="minor">
+            <a:schemeClr val="tx1"/>
+          </a:fontRef>
+        </p:style>
+      </p:cxnSp>
+      <p:cxnSp>
+        <p:nvCxnSpPr>
+          <p:cNvPr id="87" name="Conector recto 86">
+            <a:extLst>
+              <a:ext uri="{FF2B5EF4-FFF2-40B4-BE49-F238E27FC236}">
+                <a16:creationId xmlns:a16="http://schemas.microsoft.com/office/drawing/2014/main" id="{C368847F-0D3A-FD7D-B1F0-B681AC6B786C}"/>
+              </a:ext>
+            </a:extLst>
+          </p:cNvPr>
+          <p:cNvCxnSpPr>
+            <a:cxnSpLocks/>
+            <a:stCxn id="3" idx="2"/>
+          </p:cNvCxnSpPr>
+          <p:nvPr/>
+        </p:nvCxnSpPr>
+        <p:spPr>
+          <a:xfrm flipH="1">
+            <a:off x="4845020" y="5085649"/>
+            <a:ext cx="4372638" cy="0"/>
+          </a:xfrm>
+          <a:prstGeom prst="line">
+            <a:avLst/>
+          </a:prstGeom>
+        </p:spPr>
+        <p:style>
+          <a:lnRef idx="1">
+            <a:schemeClr val="dk1"/>
+          </a:lnRef>
+          <a:fillRef idx="0">
+            <a:schemeClr val="dk1"/>
+          </a:fillRef>
+          <a:effectRef idx="0">
+            <a:schemeClr val="dk1"/>
+          </a:effectRef>
+          <a:fontRef idx="minor">
+            <a:schemeClr val="tx1"/>
+          </a:fontRef>
+        </p:style>
+      </p:cxnSp>
+      <p:sp>
+        <p:nvSpPr>
+          <p:cNvPr id="92" name="CuadroTexto 91">
+            <a:extLst>
+              <a:ext uri="{FF2B5EF4-FFF2-40B4-BE49-F238E27FC236}">
+                <a16:creationId xmlns:a16="http://schemas.microsoft.com/office/drawing/2014/main" id="{D0702F18-EEBE-7226-EBCE-0B72D71C5AFC}"/>
+              </a:ext>
+            </a:extLst>
+          </p:cNvPr>
+          <p:cNvSpPr txBox="1"/>
+          <p:nvPr/>
+        </p:nvSpPr>
+        <p:spPr>
+          <a:xfrm>
+            <a:off x="4511334" y="2978281"/>
+            <a:ext cx="447378" cy="246221"/>
+          </a:xfrm>
+          <a:prstGeom prst="rect">
+            <a:avLst/>
+          </a:prstGeom>
+          <a:noFill/>
+        </p:spPr>
+        <p:txBody>
+          <a:bodyPr wrap="square" rtlCol="0">
+            <a:spAutoFit/>
+          </a:bodyPr>
+          <a:lstStyle/>
+          <a:p>
+            <a:r>
+              <a:rPr lang="es-ES" sz="1000" dirty="0"/>
+              <a:t>ADC</a:t>
+            </a:r>
+          </a:p>
+        </p:txBody>
+      </p:sp>
+      <p:sp>
+        <p:nvSpPr>
+          <p:cNvPr id="94" name="CuadroTexto 93">
+            <a:extLst>
+              <a:ext uri="{FF2B5EF4-FFF2-40B4-BE49-F238E27FC236}">
+                <a16:creationId xmlns:a16="http://schemas.microsoft.com/office/drawing/2014/main" id="{1CA4BEC4-34B2-1003-72F5-2E0301196F44}"/>
+              </a:ext>
+            </a:extLst>
+          </p:cNvPr>
+          <p:cNvSpPr txBox="1"/>
+          <p:nvPr/>
+        </p:nvSpPr>
+        <p:spPr>
+          <a:xfrm>
+            <a:off x="4411516" y="1973712"/>
+            <a:ext cx="552594" cy="246221"/>
+          </a:xfrm>
+          <a:prstGeom prst="rect">
+            <a:avLst/>
+          </a:prstGeom>
+          <a:noFill/>
+        </p:spPr>
+        <p:txBody>
+          <a:bodyPr wrap="square" rtlCol="0">
+            <a:spAutoFit/>
+          </a:bodyPr>
+          <a:lstStyle/>
+          <a:p>
+            <a:r>
+              <a:rPr lang="es-ES" sz="1000" dirty="0"/>
+              <a:t>DO27</a:t>
+            </a:r>
+          </a:p>
+        </p:txBody>
+      </p:sp>
+      <p:sp>
+        <p:nvSpPr>
+          <p:cNvPr id="98" name="Rectángulo 97">
+            <a:extLst>
+              <a:ext uri="{FF2B5EF4-FFF2-40B4-BE49-F238E27FC236}">
+                <a16:creationId xmlns:a16="http://schemas.microsoft.com/office/drawing/2014/main" id="{80683197-A762-2517-9F4F-BE6BBD91D85F}"/>
+              </a:ext>
+            </a:extLst>
+          </p:cNvPr>
+          <p:cNvSpPr/>
+          <p:nvPr/>
+        </p:nvSpPr>
+        <p:spPr>
+          <a:xfrm>
+            <a:off x="90432" y="2705799"/>
+            <a:ext cx="996410" cy="1276525"/>
+          </a:xfrm>
+          <a:prstGeom prst="rect">
+            <a:avLst/>
+          </a:prstGeom>
+        </p:spPr>
+        <p:style>
+          <a:lnRef idx="2">
+            <a:schemeClr val="dk1"/>
+          </a:lnRef>
+          <a:fillRef idx="1">
+            <a:schemeClr val="lt1"/>
+          </a:fillRef>
+          <a:effectRef idx="0">
+            <a:schemeClr val="dk1"/>
+          </a:effectRef>
+          <a:fontRef idx="minor">
+            <a:schemeClr val="dk1"/>
+          </a:fontRef>
+        </p:style>
+        <p:txBody>
+          <a:bodyPr rtlCol="0" anchor="ctr"/>
+          <a:lstStyle/>
+          <a:p>
+            <a:pPr algn="ctr"/>
+            <a:r>
+              <a:rPr lang="es-ES" dirty="0"/>
+              <a:t>REG BUCK</a:t>
+            </a:r>
+          </a:p>
+          <a:p>
+            <a:pPr algn="ctr"/>
+            <a:r>
+              <a:rPr lang="es-ES" dirty="0"/>
+              <a:t>5 V</a:t>
+            </a:r>
+          </a:p>
+        </p:txBody>
+      </p:sp>
+      <p:cxnSp>
+        <p:nvCxnSpPr>
+          <p:cNvPr id="100" name="Conector recto 99">
+            <a:extLst>
+              <a:ext uri="{FF2B5EF4-FFF2-40B4-BE49-F238E27FC236}">
+                <a16:creationId xmlns:a16="http://schemas.microsoft.com/office/drawing/2014/main" id="{4012D88E-636F-5FEB-0E6D-7956BE109480}"/>
+              </a:ext>
+            </a:extLst>
+          </p:cNvPr>
+          <p:cNvCxnSpPr>
+            <a:cxnSpLocks/>
+          </p:cNvCxnSpPr>
+          <p:nvPr/>
+        </p:nvCxnSpPr>
+        <p:spPr>
+          <a:xfrm flipV="1">
+            <a:off x="773195" y="345347"/>
+            <a:ext cx="0" cy="2360452"/>
+          </a:xfrm>
+          <a:prstGeom prst="line">
+            <a:avLst/>
+          </a:prstGeom>
+        </p:spPr>
+        <p:style>
+          <a:lnRef idx="1">
+            <a:schemeClr val="dk1"/>
+          </a:lnRef>
+          <a:fillRef idx="0">
+            <a:schemeClr val="dk1"/>
+          </a:fillRef>
+          <a:effectRef idx="0">
+            <a:schemeClr val="dk1"/>
+          </a:effectRef>
+          <a:fontRef idx="minor">
+            <a:schemeClr val="tx1"/>
+          </a:fontRef>
+        </p:style>
+      </p:cxnSp>
+      <p:cxnSp>
+        <p:nvCxnSpPr>
+          <p:cNvPr id="105" name="Conector recto 104">
+            <a:extLst>
+              <a:ext uri="{FF2B5EF4-FFF2-40B4-BE49-F238E27FC236}">
+                <a16:creationId xmlns:a16="http://schemas.microsoft.com/office/drawing/2014/main" id="{6560C847-387F-0B76-B387-512CF228A27B}"/>
+              </a:ext>
+            </a:extLst>
+          </p:cNvPr>
+          <p:cNvCxnSpPr>
+            <a:cxnSpLocks/>
+          </p:cNvCxnSpPr>
+          <p:nvPr/>
+        </p:nvCxnSpPr>
+        <p:spPr>
+          <a:xfrm>
+            <a:off x="588637" y="3982324"/>
+            <a:ext cx="0" cy="2226927"/>
+          </a:xfrm>
+          <a:prstGeom prst="line">
+            <a:avLst/>
+          </a:prstGeom>
+        </p:spPr>
+        <p:style>
+          <a:lnRef idx="1">
+            <a:schemeClr val="dk1"/>
+          </a:lnRef>
+          <a:fillRef idx="0">
+            <a:schemeClr val="dk1"/>
+          </a:fillRef>
+          <a:effectRef idx="0">
+            <a:schemeClr val="dk1"/>
+          </a:effectRef>
+          <a:fontRef idx="minor">
+            <a:schemeClr val="tx1"/>
+          </a:fontRef>
+        </p:style>
+      </p:cxnSp>
+      <p:cxnSp>
+        <p:nvCxnSpPr>
+          <p:cNvPr id="114" name="Conector recto 113">
+            <a:extLst>
+              <a:ext uri="{FF2B5EF4-FFF2-40B4-BE49-F238E27FC236}">
+                <a16:creationId xmlns:a16="http://schemas.microsoft.com/office/drawing/2014/main" id="{B2095BD1-8DF2-F87E-9BE9-F47659DA36C8}"/>
+              </a:ext>
+            </a:extLst>
+          </p:cNvPr>
+          <p:cNvCxnSpPr>
+            <a:cxnSpLocks/>
+          </p:cNvCxnSpPr>
+          <p:nvPr/>
+        </p:nvCxnSpPr>
+        <p:spPr>
+          <a:xfrm flipH="1">
+            <a:off x="1086842" y="2852351"/>
+            <a:ext cx="2864461" cy="0"/>
+          </a:xfrm>
+          <a:prstGeom prst="line">
+            <a:avLst/>
+          </a:prstGeom>
+          <a:ln>
+            <a:solidFill>
+              <a:srgbClr val="FF0000"/>
+            </a:solidFill>
+          </a:ln>
+        </p:spPr>
+        <p:style>
+          <a:lnRef idx="3">
+            <a:schemeClr val="accent2"/>
+          </a:lnRef>
+          <a:fillRef idx="0">
+            <a:schemeClr val="accent2"/>
+          </a:fillRef>
+          <a:effectRef idx="2">
+            <a:schemeClr val="accent2"/>
+          </a:effectRef>
+          <a:fontRef idx="minor">
+            <a:schemeClr val="tx1"/>
+          </a:fontRef>
+        </p:style>
+      </p:cxnSp>
       <p:sp>
         <p:nvSpPr>
           <p:cNvPr id="118" name="Rectángulo 117">
@@ -5043,7 +5129,7 @@
             <a:pPr algn="ctr"/>
             <a:r>
               <a:rPr lang="es-ES" dirty="0"/>
-              <a:t>DHT11</a:t>
+              <a:t>DHT22</a:t>
             </a:r>
           </a:p>
         </p:txBody>
@@ -5176,8 +5262,8 @@
         </p:nvSpPr>
         <p:spPr>
           <a:xfrm>
-            <a:off x="4378014" y="3768814"/>
-            <a:ext cx="447378" cy="246221"/>
+            <a:off x="4282841" y="3782460"/>
+            <a:ext cx="708203" cy="230832"/>
           </a:xfrm>
           <a:prstGeom prst="rect">
             <a:avLst/>
@@ -5191,8 +5277,8 @@
           <a:lstStyle/>
           <a:p>
             <a:r>
-              <a:rPr lang="es-ES" sz="1000" dirty="0"/>
-              <a:t>Serie</a:t>
+              <a:rPr lang="es-ES" sz="900" dirty="0"/>
+              <a:t>DIO14*</a:t>
             </a:r>
           </a:p>
         </p:txBody>
@@ -5211,8 +5297,8 @@
         </p:nvSpPr>
         <p:spPr>
           <a:xfrm>
-            <a:off x="4329954" y="4538036"/>
-            <a:ext cx="490740" cy="246221"/>
+            <a:off x="4434013" y="4525543"/>
+            <a:ext cx="535814" cy="246221"/>
           </a:xfrm>
           <a:prstGeom prst="rect">
             <a:avLst/>
@@ -5227,7 +5313,7 @@
           <a:p>
             <a:r>
               <a:rPr lang="es-ES" sz="1000" dirty="0"/>
-              <a:t>DO2</a:t>
+              <a:t>DO26</a:t>
             </a:r>
           </a:p>
         </p:txBody>
@@ -5366,7 +5452,7 @@
             <a:pPr algn="ctr"/>
             <a:r>
               <a:rPr lang="es-ES" dirty="0"/>
-              <a:t>10 W</a:t>
+              <a:t>14 OHM 10 W</a:t>
             </a:r>
           </a:p>
         </p:txBody>
@@ -5544,7 +5630,7 @@
             <a:pPr algn="ctr"/>
             <a:r>
               <a:rPr lang="es-ES" dirty="0"/>
-              <a:t>9 W</a:t>
+              <a:t>16 OHM 9 W</a:t>
             </a:r>
           </a:p>
         </p:txBody>
@@ -5601,7 +5687,7 @@
         </p:nvSpPr>
         <p:spPr>
           <a:xfrm>
-            <a:off x="4365900" y="4975992"/>
+            <a:off x="4429408" y="4982120"/>
             <a:ext cx="490740" cy="246221"/>
           </a:xfrm>
           <a:prstGeom prst="rect">
@@ -5617,7 +5703,7 @@
           <a:p>
             <a:r>
               <a:rPr lang="es-ES" sz="1000" dirty="0"/>
-              <a:t>DO3</a:t>
+              <a:t>DO25</a:t>
             </a:r>
           </a:p>
         </p:txBody>
@@ -5814,8 +5900,8 @@
         </p:nvSpPr>
         <p:spPr>
           <a:xfrm>
-            <a:off x="3957893" y="1576120"/>
-            <a:ext cx="473121" cy="246221"/>
+            <a:off x="3441342" y="852349"/>
+            <a:ext cx="572876" cy="861774"/>
           </a:xfrm>
           <a:prstGeom prst="rect">
             <a:avLst/>
@@ -5829,8 +5915,32 @@
           <a:lstStyle/>
           <a:p>
             <a:r>
-              <a:rPr lang="es-ES" sz="1000" dirty="0"/>
-              <a:t>SPI</a:t>
+              <a:rPr lang="nb-NO" sz="1000" dirty="0"/>
+              <a:t>CLK 18</a:t>
+            </a:r>
+          </a:p>
+          <a:p>
+            <a:r>
+              <a:rPr lang="nb-NO" sz="1000" dirty="0"/>
+              <a:t>DIN 23</a:t>
+            </a:r>
+          </a:p>
+          <a:p>
+            <a:r>
+              <a:rPr lang="nb-NO" sz="1000" dirty="0"/>
+              <a:t>DC 19</a:t>
+            </a:r>
+          </a:p>
+          <a:p>
+            <a:r>
+              <a:rPr lang="nb-NO" sz="1000" dirty="0"/>
+              <a:t>CE 5</a:t>
+            </a:r>
+          </a:p>
+          <a:p>
+            <a:r>
+              <a:rPr lang="nb-NO" sz="1000" dirty="0"/>
+              <a:t>RST 2</a:t>
             </a:r>
           </a:p>
         </p:txBody>
@@ -5849,7 +5959,7 @@
         </p:nvCxnSpPr>
         <p:spPr>
           <a:xfrm flipH="1">
-            <a:off x="3496180" y="1546010"/>
+            <a:off x="3247604" y="1546010"/>
             <a:ext cx="171450" cy="246221"/>
           </a:xfrm>
           <a:prstGeom prst="line">
@@ -5885,7 +5995,7 @@
         </p:nvSpPr>
         <p:spPr>
           <a:xfrm>
-            <a:off x="3540696" y="1332901"/>
+            <a:off x="3292120" y="1332901"/>
             <a:ext cx="205562" cy="261610"/>
           </a:xfrm>
           <a:prstGeom prst="rect">
@@ -6008,7 +6118,7 @@
         <p:spPr>
           <a:xfrm>
             <a:off x="3947222" y="1786332"/>
-            <a:ext cx="473121" cy="246221"/>
+            <a:ext cx="590638" cy="246221"/>
           </a:xfrm>
           <a:prstGeom prst="rect">
             <a:avLst/>
@@ -6023,17 +6133,205 @@
           <a:p>
             <a:r>
               <a:rPr lang="es-ES" sz="1000" dirty="0"/>
-              <a:t>DO4</a:t>
-            </a:r>
-          </a:p>
-        </p:txBody>
-      </p:sp>
-      <p:sp>
-        <p:nvSpPr>
-          <p:cNvPr id="75" name="CuadroTexto 74">
-            <a:extLst>
-              <a:ext uri="{FF2B5EF4-FFF2-40B4-BE49-F238E27FC236}">
-                <a16:creationId xmlns:a16="http://schemas.microsoft.com/office/drawing/2014/main" id="{1E184B83-2DA4-1C86-9CF4-2E215CCF3E71}"/>
+              <a:t>DIO0*</a:t>
+            </a:r>
+          </a:p>
+        </p:txBody>
+      </p:sp>
+      <p:sp>
+        <p:nvSpPr>
+          <p:cNvPr id="78" name="Rectángulo 77">
+            <a:extLst>
+              <a:ext uri="{FF2B5EF4-FFF2-40B4-BE49-F238E27FC236}">
+                <a16:creationId xmlns:a16="http://schemas.microsoft.com/office/drawing/2014/main" id="{40E278A4-9B26-4D3A-5EC5-F9EBD6843003}"/>
+              </a:ext>
+            </a:extLst>
+          </p:cNvPr>
+          <p:cNvSpPr/>
+          <p:nvPr/>
+        </p:nvSpPr>
+        <p:spPr>
+          <a:xfrm>
+            <a:off x="2142101" y="4952276"/>
+            <a:ext cx="477878" cy="334641"/>
+          </a:xfrm>
+          <a:prstGeom prst="rect">
+            <a:avLst/>
+          </a:prstGeom>
+        </p:spPr>
+        <p:style>
+          <a:lnRef idx="2">
+            <a:schemeClr val="dk1"/>
+          </a:lnRef>
+          <a:fillRef idx="1">
+            <a:schemeClr val="lt1"/>
+          </a:fillRef>
+          <a:effectRef idx="0">
+            <a:schemeClr val="dk1"/>
+          </a:effectRef>
+          <a:fontRef idx="minor">
+            <a:schemeClr val="dk1"/>
+          </a:fontRef>
+        </p:style>
+        <p:txBody>
+          <a:bodyPr rtlCol="0" anchor="ctr"/>
+          <a:lstStyle/>
+          <a:p>
+            <a:pPr algn="ctr"/>
+            <a:r>
+              <a:rPr lang="es-ES" dirty="0"/>
+              <a:t>+</a:t>
+            </a:r>
+          </a:p>
+        </p:txBody>
+      </p:sp>
+      <p:sp>
+        <p:nvSpPr>
+          <p:cNvPr id="80" name="Rectángulo 79">
+            <a:extLst>
+              <a:ext uri="{FF2B5EF4-FFF2-40B4-BE49-F238E27FC236}">
+                <a16:creationId xmlns:a16="http://schemas.microsoft.com/office/drawing/2014/main" id="{4349E105-E5AD-CFBC-47C4-749CDD90F087}"/>
+              </a:ext>
+            </a:extLst>
+          </p:cNvPr>
+          <p:cNvSpPr/>
+          <p:nvPr/>
+        </p:nvSpPr>
+        <p:spPr>
+          <a:xfrm>
+            <a:off x="2756339" y="4952276"/>
+            <a:ext cx="477878" cy="334641"/>
+          </a:xfrm>
+          <a:prstGeom prst="rect">
+            <a:avLst/>
+          </a:prstGeom>
+        </p:spPr>
+        <p:style>
+          <a:lnRef idx="2">
+            <a:schemeClr val="dk1"/>
+          </a:lnRef>
+          <a:fillRef idx="1">
+            <a:schemeClr val="lt1"/>
+          </a:fillRef>
+          <a:effectRef idx="0">
+            <a:schemeClr val="dk1"/>
+          </a:effectRef>
+          <a:fontRef idx="minor">
+            <a:schemeClr val="dk1"/>
+          </a:fontRef>
+        </p:style>
+        <p:txBody>
+          <a:bodyPr rtlCol="0" anchor="ctr"/>
+          <a:lstStyle/>
+          <a:p>
+            <a:pPr algn="ctr"/>
+            <a:r>
+              <a:rPr lang="es-ES" dirty="0"/>
+              <a:t>-</a:t>
+            </a:r>
+          </a:p>
+        </p:txBody>
+      </p:sp>
+      <p:sp>
+        <p:nvSpPr>
+          <p:cNvPr id="81" name="Rectángulo 80">
+            <a:extLst>
+              <a:ext uri="{FF2B5EF4-FFF2-40B4-BE49-F238E27FC236}">
+                <a16:creationId xmlns:a16="http://schemas.microsoft.com/office/drawing/2014/main" id="{B921195E-A736-004D-6C28-7C367BE71742}"/>
+              </a:ext>
+            </a:extLst>
+          </p:cNvPr>
+          <p:cNvSpPr/>
+          <p:nvPr/>
+        </p:nvSpPr>
+        <p:spPr>
+          <a:xfrm>
+            <a:off x="2142101" y="4526215"/>
+            <a:ext cx="477878" cy="334641"/>
+          </a:xfrm>
+          <a:prstGeom prst="rect">
+            <a:avLst/>
+          </a:prstGeom>
+        </p:spPr>
+        <p:style>
+          <a:lnRef idx="2">
+            <a:schemeClr val="dk1"/>
+          </a:lnRef>
+          <a:fillRef idx="1">
+            <a:schemeClr val="lt1"/>
+          </a:fillRef>
+          <a:effectRef idx="0">
+            <a:schemeClr val="dk1"/>
+          </a:effectRef>
+          <a:fontRef idx="minor">
+            <a:schemeClr val="dk1"/>
+          </a:fontRef>
+        </p:style>
+        <p:txBody>
+          <a:bodyPr rtlCol="0" anchor="ctr"/>
+          <a:lstStyle/>
+          <a:p>
+            <a:pPr algn="ctr"/>
+            <a:r>
+              <a:rPr lang="es-ES" sz="900" dirty="0"/>
+              <a:t>ACEPTAR</a:t>
+            </a:r>
+          </a:p>
+        </p:txBody>
+      </p:sp>
+      <p:sp>
+        <p:nvSpPr>
+          <p:cNvPr id="83" name="Rectángulo 82">
+            <a:extLst>
+              <a:ext uri="{FF2B5EF4-FFF2-40B4-BE49-F238E27FC236}">
+                <a16:creationId xmlns:a16="http://schemas.microsoft.com/office/drawing/2014/main" id="{7E1AC288-3AC9-866E-5AE1-073E9388F25E}"/>
+              </a:ext>
+            </a:extLst>
+          </p:cNvPr>
+          <p:cNvSpPr/>
+          <p:nvPr/>
+        </p:nvSpPr>
+        <p:spPr>
+          <a:xfrm>
+            <a:off x="2753928" y="4522518"/>
+            <a:ext cx="477878" cy="334641"/>
+          </a:xfrm>
+          <a:prstGeom prst="rect">
+            <a:avLst/>
+          </a:prstGeom>
+        </p:spPr>
+        <p:style>
+          <a:lnRef idx="2">
+            <a:schemeClr val="dk1"/>
+          </a:lnRef>
+          <a:fillRef idx="1">
+            <a:schemeClr val="lt1"/>
+          </a:fillRef>
+          <a:effectRef idx="0">
+            <a:schemeClr val="dk1"/>
+          </a:effectRef>
+          <a:fontRef idx="minor">
+            <a:schemeClr val="dk1"/>
+          </a:fontRef>
+        </p:style>
+        <p:txBody>
+          <a:bodyPr rtlCol="0" anchor="ctr"/>
+          <a:lstStyle/>
+          <a:p>
+            <a:pPr algn="ctr"/>
+            <a:r>
+              <a:rPr lang="es-ES" sz="900" dirty="0"/>
+              <a:t>CANCELAR</a:t>
+            </a:r>
+          </a:p>
+        </p:txBody>
+      </p:sp>
+      <p:sp>
+        <p:nvSpPr>
+          <p:cNvPr id="5" name="CuadroTexto 4">
+            <a:extLst>
+              <a:ext uri="{FF2B5EF4-FFF2-40B4-BE49-F238E27FC236}">
+                <a16:creationId xmlns:a16="http://schemas.microsoft.com/office/drawing/2014/main" id="{18B09437-9125-E019-8DE3-CA5101AFAA6B}"/>
               </a:ext>
             </a:extLst>
           </p:cNvPr>
@@ -6042,8 +6340,8 @@
         </p:nvSpPr>
         <p:spPr>
           <a:xfrm>
-            <a:off x="3948720" y="2729894"/>
-            <a:ext cx="473121" cy="246221"/>
+            <a:off x="387893" y="6365888"/>
+            <a:ext cx="3031162" cy="230832"/>
           </a:xfrm>
           <a:prstGeom prst="rect">
             <a:avLst/>
@@ -6057,206 +6355,231 @@
           <a:lstStyle/>
           <a:p>
             <a:r>
-              <a:rPr lang="es-ES" sz="1000" dirty="0"/>
-              <a:t>5V</a:t>
-            </a:r>
-          </a:p>
-        </p:txBody>
-      </p:sp>
-      <p:sp>
-        <p:nvSpPr>
-          <p:cNvPr id="78" name="Rectángulo 77">
-            <a:extLst>
-              <a:ext uri="{FF2B5EF4-FFF2-40B4-BE49-F238E27FC236}">
-                <a16:creationId xmlns:a16="http://schemas.microsoft.com/office/drawing/2014/main" id="{40E278A4-9B26-4D3A-5EC5-F9EBD6843003}"/>
-              </a:ext>
-            </a:extLst>
-          </p:cNvPr>
-          <p:cNvSpPr/>
-          <p:nvPr/>
-        </p:nvSpPr>
-        <p:spPr>
-          <a:xfrm>
-            <a:off x="2431921" y="3489381"/>
-            <a:ext cx="477878" cy="334641"/>
+              <a:rPr lang="es-ES" sz="900" dirty="0"/>
+              <a:t>* Etiqueta DIO -  Cambia entre entrada y salida </a:t>
+            </a:r>
+          </a:p>
+        </p:txBody>
+      </p:sp>
+      <p:sp>
+        <p:nvSpPr>
+          <p:cNvPr id="7" name="CuadroTexto 6">
+            <a:extLst>
+              <a:ext uri="{FF2B5EF4-FFF2-40B4-BE49-F238E27FC236}">
+                <a16:creationId xmlns:a16="http://schemas.microsoft.com/office/drawing/2014/main" id="{63C5BD55-0FF7-0216-A58D-A0F66CAD61BD}"/>
+              </a:ext>
+            </a:extLst>
+          </p:cNvPr>
+          <p:cNvSpPr txBox="1"/>
+          <p:nvPr/>
+        </p:nvSpPr>
+        <p:spPr>
+          <a:xfrm>
+            <a:off x="3977848" y="1532416"/>
+            <a:ext cx="436536" cy="261610"/>
           </a:xfrm>
           <a:prstGeom prst="rect">
             <a:avLst/>
           </a:prstGeom>
-        </p:spPr>
-        <p:style>
-          <a:lnRef idx="2">
-            <a:schemeClr val="dk1"/>
-          </a:lnRef>
-          <a:fillRef idx="1">
-            <a:schemeClr val="lt1"/>
-          </a:fillRef>
-          <a:effectRef idx="0">
-            <a:schemeClr val="dk1"/>
-          </a:effectRef>
-          <a:fontRef idx="minor">
-            <a:schemeClr val="dk1"/>
-          </a:fontRef>
-        </p:style>
-        <p:txBody>
-          <a:bodyPr rtlCol="0" anchor="ctr"/>
-          <a:lstStyle/>
-          <a:p>
-            <a:pPr algn="ctr"/>
-            <a:r>
-              <a:rPr lang="es-ES" dirty="0"/>
-              <a:t>+</a:t>
-            </a:r>
-          </a:p>
-        </p:txBody>
-      </p:sp>
-      <p:sp>
-        <p:nvSpPr>
-          <p:cNvPr id="80" name="Rectángulo 79">
-            <a:extLst>
-              <a:ext uri="{FF2B5EF4-FFF2-40B4-BE49-F238E27FC236}">
-                <a16:creationId xmlns:a16="http://schemas.microsoft.com/office/drawing/2014/main" id="{4349E105-E5AD-CFBC-47C4-749CDD90F087}"/>
-              </a:ext>
-            </a:extLst>
-          </p:cNvPr>
-          <p:cNvSpPr/>
-          <p:nvPr/>
-        </p:nvSpPr>
-        <p:spPr>
-          <a:xfrm>
-            <a:off x="2140628" y="3931269"/>
-            <a:ext cx="477878" cy="334641"/>
+          <a:noFill/>
+        </p:spPr>
+        <p:txBody>
+          <a:bodyPr wrap="square" rtlCol="0">
+            <a:spAutoFit/>
+          </a:bodyPr>
+          <a:lstStyle/>
+          <a:p>
+            <a:r>
+              <a:rPr lang="es-ES" sz="1100" dirty="0"/>
+              <a:t>SPI</a:t>
+            </a:r>
+          </a:p>
+        </p:txBody>
+      </p:sp>
+      <p:grpSp>
+        <p:nvGrpSpPr>
+          <p:cNvPr id="29" name="Grupo 28">
+            <a:extLst>
+              <a:ext uri="{FF2B5EF4-FFF2-40B4-BE49-F238E27FC236}">
+                <a16:creationId xmlns:a16="http://schemas.microsoft.com/office/drawing/2014/main" id="{696F3ECE-F5F0-3B12-C8C7-95015DC5157B}"/>
+              </a:ext>
+            </a:extLst>
+          </p:cNvPr>
+          <p:cNvGrpSpPr/>
+          <p:nvPr/>
+        </p:nvGrpSpPr>
+        <p:grpSpPr>
+          <a:xfrm>
+            <a:off x="1683372" y="4515139"/>
+            <a:ext cx="159603" cy="159603"/>
+            <a:chOff x="2649165" y="3816350"/>
+            <a:chExt cx="159603" cy="159603"/>
+          </a:xfrm>
+        </p:grpSpPr>
+        <p:sp>
+          <p:nvSpPr>
+            <p:cNvPr id="14" name="Elipse 13">
+              <a:extLst>
+                <a:ext uri="{FF2B5EF4-FFF2-40B4-BE49-F238E27FC236}">
+                  <a16:creationId xmlns:a16="http://schemas.microsoft.com/office/drawing/2014/main" id="{7A3E6329-C023-357A-193F-CEA2636B6C3D}"/>
+                </a:ext>
+              </a:extLst>
+            </p:cNvPr>
+            <p:cNvSpPr/>
+            <p:nvPr/>
+          </p:nvSpPr>
+          <p:spPr>
+            <a:xfrm>
+              <a:off x="2649165" y="3816350"/>
+              <a:ext cx="159603" cy="159603"/>
+            </a:xfrm>
+            <a:prstGeom prst="ellipse">
+              <a:avLst/>
+            </a:prstGeom>
+          </p:spPr>
+          <p:style>
+            <a:lnRef idx="2">
+              <a:schemeClr val="dk1"/>
+            </a:lnRef>
+            <a:fillRef idx="1">
+              <a:schemeClr val="lt1"/>
+            </a:fillRef>
+            <a:effectRef idx="0">
+              <a:schemeClr val="dk1"/>
+            </a:effectRef>
+            <a:fontRef idx="minor">
+              <a:schemeClr val="dk1"/>
+            </a:fontRef>
+          </p:style>
+          <p:txBody>
+            <a:bodyPr rtlCol="0" anchor="ctr"/>
+            <a:lstStyle/>
+            <a:p>
+              <a:pPr algn="ctr"/>
+              <a:endParaRPr lang="es-ES"/>
+            </a:p>
+          </p:txBody>
+        </p:sp>
+        <p:cxnSp>
+          <p:nvCxnSpPr>
+            <p:cNvPr id="20" name="Conector recto 19">
+              <a:extLst>
+                <a:ext uri="{FF2B5EF4-FFF2-40B4-BE49-F238E27FC236}">
+                  <a16:creationId xmlns:a16="http://schemas.microsoft.com/office/drawing/2014/main" id="{E6B62358-1463-A41E-512E-FFD4CBDC8746}"/>
+                </a:ext>
+              </a:extLst>
+            </p:cNvPr>
+            <p:cNvCxnSpPr>
+              <a:stCxn id="14" idx="1"/>
+              <a:endCxn id="14" idx="5"/>
+            </p:cNvCxnSpPr>
+            <p:nvPr/>
+          </p:nvCxnSpPr>
+          <p:spPr>
+            <a:xfrm>
+              <a:off x="2672538" y="3839723"/>
+              <a:ext cx="112857" cy="112857"/>
+            </a:xfrm>
+            <a:prstGeom prst="line">
+              <a:avLst/>
+            </a:prstGeom>
+          </p:spPr>
+          <p:style>
+            <a:lnRef idx="2">
+              <a:schemeClr val="dk1"/>
+            </a:lnRef>
+            <a:fillRef idx="1">
+              <a:schemeClr val="lt1"/>
+            </a:fillRef>
+            <a:effectRef idx="0">
+              <a:schemeClr val="dk1"/>
+            </a:effectRef>
+            <a:fontRef idx="minor">
+              <a:schemeClr val="dk1"/>
+            </a:fontRef>
+          </p:style>
+        </p:cxnSp>
+        <p:cxnSp>
+          <p:nvCxnSpPr>
+            <p:cNvPr id="28" name="Conector recto 27">
+              <a:extLst>
+                <a:ext uri="{FF2B5EF4-FFF2-40B4-BE49-F238E27FC236}">
+                  <a16:creationId xmlns:a16="http://schemas.microsoft.com/office/drawing/2014/main" id="{F0066F67-703A-0720-054A-1D43CC8EF531}"/>
+                </a:ext>
+              </a:extLst>
+            </p:cNvPr>
+            <p:cNvCxnSpPr>
+              <a:stCxn id="14" idx="7"/>
+              <a:endCxn id="14" idx="3"/>
+            </p:cNvCxnSpPr>
+            <p:nvPr/>
+          </p:nvCxnSpPr>
+          <p:spPr>
+            <a:xfrm flipH="1">
+              <a:off x="2672538" y="3839723"/>
+              <a:ext cx="112857" cy="112857"/>
+            </a:xfrm>
+            <a:prstGeom prst="line">
+              <a:avLst/>
+            </a:prstGeom>
+          </p:spPr>
+          <p:style>
+            <a:lnRef idx="2">
+              <a:schemeClr val="dk1"/>
+            </a:lnRef>
+            <a:fillRef idx="1">
+              <a:schemeClr val="lt1"/>
+            </a:fillRef>
+            <a:effectRef idx="0">
+              <a:schemeClr val="dk1"/>
+            </a:effectRef>
+            <a:fontRef idx="minor">
+              <a:schemeClr val="dk1"/>
+            </a:fontRef>
+          </p:style>
+        </p:cxnSp>
+      </p:grpSp>
+      <p:sp>
+        <p:nvSpPr>
+          <p:cNvPr id="30" name="CuadroTexto 29">
+            <a:extLst>
+              <a:ext uri="{FF2B5EF4-FFF2-40B4-BE49-F238E27FC236}">
+                <a16:creationId xmlns:a16="http://schemas.microsoft.com/office/drawing/2014/main" id="{F91A27E1-4F31-646F-83DF-DAFCAA634606}"/>
+              </a:ext>
+            </a:extLst>
+          </p:cNvPr>
+          <p:cNvSpPr txBox="1"/>
+          <p:nvPr/>
+        </p:nvSpPr>
+        <p:spPr>
+          <a:xfrm>
+            <a:off x="1790264" y="4469241"/>
+            <a:ext cx="387589" cy="276999"/>
           </a:xfrm>
           <a:prstGeom prst="rect">
             <a:avLst/>
           </a:prstGeom>
-        </p:spPr>
-        <p:style>
-          <a:lnRef idx="2">
-            <a:schemeClr val="dk1"/>
-          </a:lnRef>
-          <a:fillRef idx="1">
-            <a:schemeClr val="lt1"/>
-          </a:fillRef>
-          <a:effectRef idx="0">
-            <a:schemeClr val="dk1"/>
-          </a:effectRef>
-          <a:fontRef idx="minor">
-            <a:schemeClr val="dk1"/>
-          </a:fontRef>
-        </p:style>
-        <p:txBody>
-          <a:bodyPr rtlCol="0" anchor="ctr"/>
-          <a:lstStyle/>
-          <a:p>
-            <a:pPr algn="ctr"/>
-            <a:r>
-              <a:rPr lang="es-ES" dirty="0"/>
-              <a:t>-</a:t>
-            </a:r>
-          </a:p>
-        </p:txBody>
-      </p:sp>
-      <p:sp>
-        <p:nvSpPr>
-          <p:cNvPr id="81" name="Rectángulo 80">
-            <a:extLst>
-              <a:ext uri="{FF2B5EF4-FFF2-40B4-BE49-F238E27FC236}">
-                <a16:creationId xmlns:a16="http://schemas.microsoft.com/office/drawing/2014/main" id="{B921195E-A736-004D-6C28-7C367BE71742}"/>
-              </a:ext>
-            </a:extLst>
-          </p:cNvPr>
-          <p:cNvSpPr/>
-          <p:nvPr/>
-        </p:nvSpPr>
-        <p:spPr>
-          <a:xfrm>
-            <a:off x="1861443" y="4391445"/>
-            <a:ext cx="477878" cy="334641"/>
-          </a:xfrm>
-          <a:prstGeom prst="rect">
-            <a:avLst/>
-          </a:prstGeom>
-        </p:spPr>
-        <p:style>
-          <a:lnRef idx="2">
-            <a:schemeClr val="dk1"/>
-          </a:lnRef>
-          <a:fillRef idx="1">
-            <a:schemeClr val="lt1"/>
-          </a:fillRef>
-          <a:effectRef idx="0">
-            <a:schemeClr val="dk1"/>
-          </a:effectRef>
-          <a:fontRef idx="minor">
-            <a:schemeClr val="dk1"/>
-          </a:fontRef>
-        </p:style>
-        <p:txBody>
-          <a:bodyPr rtlCol="0" anchor="ctr"/>
-          <a:lstStyle/>
-          <a:p>
-            <a:pPr algn="ctr"/>
-            <a:r>
-              <a:rPr lang="es-ES" sz="900" dirty="0"/>
-              <a:t>ACEPTAR</a:t>
-            </a:r>
-          </a:p>
-        </p:txBody>
-      </p:sp>
-      <p:sp>
-        <p:nvSpPr>
-          <p:cNvPr id="83" name="Rectángulo 82">
-            <a:extLst>
-              <a:ext uri="{FF2B5EF4-FFF2-40B4-BE49-F238E27FC236}">
-                <a16:creationId xmlns:a16="http://schemas.microsoft.com/office/drawing/2014/main" id="{7E1AC288-3AC9-866E-5AE1-073E9388F25E}"/>
-              </a:ext>
-            </a:extLst>
-          </p:cNvPr>
-          <p:cNvSpPr/>
-          <p:nvPr/>
-        </p:nvSpPr>
-        <p:spPr>
-          <a:xfrm>
-            <a:off x="1573677" y="4884509"/>
-            <a:ext cx="477878" cy="334641"/>
-          </a:xfrm>
-          <a:prstGeom prst="rect">
-            <a:avLst/>
-          </a:prstGeom>
-        </p:spPr>
-        <p:style>
-          <a:lnRef idx="2">
-            <a:schemeClr val="dk1"/>
-          </a:lnRef>
-          <a:fillRef idx="1">
-            <a:schemeClr val="lt1"/>
-          </a:fillRef>
-          <a:effectRef idx="0">
-            <a:schemeClr val="dk1"/>
-          </a:effectRef>
-          <a:fontRef idx="minor">
-            <a:schemeClr val="dk1"/>
-          </a:fontRef>
-        </p:style>
-        <p:txBody>
-          <a:bodyPr rtlCol="0" anchor="ctr"/>
-          <a:lstStyle/>
-          <a:p>
-            <a:pPr algn="ctr"/>
-            <a:r>
-              <a:rPr lang="es-ES" sz="900" dirty="0"/>
-              <a:t>CANCELAR</a:t>
+          <a:noFill/>
+        </p:spPr>
+        <p:txBody>
+          <a:bodyPr wrap="square" rtlCol="0">
+            <a:spAutoFit/>
+          </a:bodyPr>
+          <a:lstStyle/>
+          <a:p>
+            <a:r>
+              <a:rPr lang="es-ES" sz="400" dirty="0"/>
+              <a:t>Piloto poca humedad</a:t>
             </a:r>
           </a:p>
         </p:txBody>
       </p:sp>
       <p:cxnSp>
         <p:nvCxnSpPr>
-          <p:cNvPr id="86" name="Conector recto 85">
-            <a:extLst>
-              <a:ext uri="{FF2B5EF4-FFF2-40B4-BE49-F238E27FC236}">
-                <a16:creationId xmlns:a16="http://schemas.microsoft.com/office/drawing/2014/main" id="{A4A1628F-5637-4C23-4201-B42BC4C62B9C}"/>
+          <p:cNvPr id="33" name="Conector recto 32">
+            <a:extLst>
+              <a:ext uri="{FF2B5EF4-FFF2-40B4-BE49-F238E27FC236}">
+                <a16:creationId xmlns:a16="http://schemas.microsoft.com/office/drawing/2014/main" id="{7CEF7329-FB2C-DAF3-9971-1E9690D5EA85}"/>
               </a:ext>
             </a:extLst>
           </p:cNvPr>
@@ -6266,9 +6589,9 @@
           <p:nvPr/>
         </p:nvCxnSpPr>
         <p:spPr>
-          <a:xfrm>
-            <a:off x="1812616" y="3224502"/>
-            <a:ext cx="858244" cy="0"/>
+          <a:xfrm flipV="1">
+            <a:off x="2356367" y="4102100"/>
+            <a:ext cx="0" cy="420672"/>
           </a:xfrm>
           <a:prstGeom prst="line">
             <a:avLst/>
@@ -6276,13 +6599,13 @@
         </p:spPr>
         <p:style>
           <a:lnRef idx="1">
-            <a:schemeClr val="accent1"/>
+            <a:schemeClr val="dk1"/>
           </a:lnRef>
           <a:fillRef idx="0">
-            <a:schemeClr val="accent1"/>
-          </a:fillRef>
-          <a:effectRef idx="0">
-            <a:schemeClr val="accent1"/>
+            <a:schemeClr val="dk1"/>
+          </a:fillRef>
+          <a:effectRef idx="0">
+            <a:schemeClr val="dk1"/>
           </a:effectRef>
           <a:fontRef idx="minor">
             <a:schemeClr val="tx1"/>
@@ -6291,22 +6614,627 @@
       </p:cxnSp>
       <p:cxnSp>
         <p:nvCxnSpPr>
-          <p:cNvPr id="90" name="Conector recto 89">
-            <a:extLst>
-              <a:ext uri="{FF2B5EF4-FFF2-40B4-BE49-F238E27FC236}">
-                <a16:creationId xmlns:a16="http://schemas.microsoft.com/office/drawing/2014/main" id="{77A3EF4F-8340-A7FE-C76D-E177B537EA73}"/>
+          <p:cNvPr id="39" name="Conector recto 38">
+            <a:extLst>
+              <a:ext uri="{FF2B5EF4-FFF2-40B4-BE49-F238E27FC236}">
+                <a16:creationId xmlns:a16="http://schemas.microsoft.com/office/drawing/2014/main" id="{6AAE4EB8-6B7F-638C-A2FC-63528ED12060}"/>
+              </a:ext>
+            </a:extLst>
+          </p:cNvPr>
+          <p:cNvCxnSpPr/>
+          <p:nvPr/>
+        </p:nvCxnSpPr>
+        <p:spPr>
+          <a:xfrm flipV="1">
+            <a:off x="3055516" y="4286496"/>
+            <a:ext cx="0" cy="222648"/>
+          </a:xfrm>
+          <a:prstGeom prst="line">
+            <a:avLst/>
+          </a:prstGeom>
+        </p:spPr>
+        <p:style>
+          <a:lnRef idx="1">
+            <a:schemeClr val="dk1"/>
+          </a:lnRef>
+          <a:fillRef idx="0">
+            <a:schemeClr val="dk1"/>
+          </a:fillRef>
+          <a:effectRef idx="0">
+            <a:schemeClr val="dk1"/>
+          </a:effectRef>
+          <a:fontRef idx="minor">
+            <a:schemeClr val="tx1"/>
+          </a:fontRef>
+        </p:style>
+      </p:cxnSp>
+      <p:grpSp>
+        <p:nvGrpSpPr>
+          <p:cNvPr id="43" name="Grupo 42">
+            <a:extLst>
+              <a:ext uri="{FF2B5EF4-FFF2-40B4-BE49-F238E27FC236}">
+                <a16:creationId xmlns:a16="http://schemas.microsoft.com/office/drawing/2014/main" id="{03AD253A-C827-0C3B-AE4C-E752B74F55F1}"/>
+              </a:ext>
+            </a:extLst>
+          </p:cNvPr>
+          <p:cNvGrpSpPr/>
+          <p:nvPr/>
+        </p:nvGrpSpPr>
+        <p:grpSpPr>
+          <a:xfrm>
+            <a:off x="1683372" y="4725865"/>
+            <a:ext cx="159603" cy="159603"/>
+            <a:chOff x="2649165" y="3816350"/>
+            <a:chExt cx="159603" cy="159603"/>
+          </a:xfrm>
+        </p:grpSpPr>
+        <p:sp>
+          <p:nvSpPr>
+            <p:cNvPr id="44" name="Elipse 43">
+              <a:extLst>
+                <a:ext uri="{FF2B5EF4-FFF2-40B4-BE49-F238E27FC236}">
+                  <a16:creationId xmlns:a16="http://schemas.microsoft.com/office/drawing/2014/main" id="{4EDDBE20-F7F6-9020-4306-9B182BE9957E}"/>
+                </a:ext>
+              </a:extLst>
+            </p:cNvPr>
+            <p:cNvSpPr/>
+            <p:nvPr/>
+          </p:nvSpPr>
+          <p:spPr>
+            <a:xfrm>
+              <a:off x="2649165" y="3816350"/>
+              <a:ext cx="159603" cy="159603"/>
+            </a:xfrm>
+            <a:prstGeom prst="ellipse">
+              <a:avLst/>
+            </a:prstGeom>
+          </p:spPr>
+          <p:style>
+            <a:lnRef idx="2">
+              <a:schemeClr val="dk1"/>
+            </a:lnRef>
+            <a:fillRef idx="1">
+              <a:schemeClr val="lt1"/>
+            </a:fillRef>
+            <a:effectRef idx="0">
+              <a:schemeClr val="dk1"/>
+            </a:effectRef>
+            <a:fontRef idx="minor">
+              <a:schemeClr val="dk1"/>
+            </a:fontRef>
+          </p:style>
+          <p:txBody>
+            <a:bodyPr rtlCol="0" anchor="ctr"/>
+            <a:lstStyle/>
+            <a:p>
+              <a:pPr algn="ctr"/>
+              <a:endParaRPr lang="es-ES"/>
+            </a:p>
+          </p:txBody>
+        </p:sp>
+        <p:cxnSp>
+          <p:nvCxnSpPr>
+            <p:cNvPr id="48" name="Conector recto 47">
+              <a:extLst>
+                <a:ext uri="{FF2B5EF4-FFF2-40B4-BE49-F238E27FC236}">
+                  <a16:creationId xmlns:a16="http://schemas.microsoft.com/office/drawing/2014/main" id="{5FDFF8CF-74E8-221F-F8E4-34E5478E8E64}"/>
+                </a:ext>
+              </a:extLst>
+            </p:cNvPr>
+            <p:cNvCxnSpPr>
+              <a:stCxn id="44" idx="1"/>
+              <a:endCxn id="44" idx="5"/>
+            </p:cNvCxnSpPr>
+            <p:nvPr/>
+          </p:nvCxnSpPr>
+          <p:spPr>
+            <a:xfrm>
+              <a:off x="2672538" y="3839723"/>
+              <a:ext cx="112857" cy="112857"/>
+            </a:xfrm>
+            <a:prstGeom prst="line">
+              <a:avLst/>
+            </a:prstGeom>
+          </p:spPr>
+          <p:style>
+            <a:lnRef idx="2">
+              <a:schemeClr val="dk1"/>
+            </a:lnRef>
+            <a:fillRef idx="1">
+              <a:schemeClr val="lt1"/>
+            </a:fillRef>
+            <a:effectRef idx="0">
+              <a:schemeClr val="dk1"/>
+            </a:effectRef>
+            <a:fontRef idx="minor">
+              <a:schemeClr val="dk1"/>
+            </a:fontRef>
+          </p:style>
+        </p:cxnSp>
+        <p:cxnSp>
+          <p:nvCxnSpPr>
+            <p:cNvPr id="50" name="Conector recto 49">
+              <a:extLst>
+                <a:ext uri="{FF2B5EF4-FFF2-40B4-BE49-F238E27FC236}">
+                  <a16:creationId xmlns:a16="http://schemas.microsoft.com/office/drawing/2014/main" id="{12527104-4B63-818A-10F9-D8AD1254774A}"/>
+                </a:ext>
+              </a:extLst>
+            </p:cNvPr>
+            <p:cNvCxnSpPr>
+              <a:stCxn id="44" idx="7"/>
+              <a:endCxn id="44" idx="3"/>
+            </p:cNvCxnSpPr>
+            <p:nvPr/>
+          </p:nvCxnSpPr>
+          <p:spPr>
+            <a:xfrm flipH="1">
+              <a:off x="2672538" y="3839723"/>
+              <a:ext cx="112857" cy="112857"/>
+            </a:xfrm>
+            <a:prstGeom prst="line">
+              <a:avLst/>
+            </a:prstGeom>
+          </p:spPr>
+          <p:style>
+            <a:lnRef idx="2">
+              <a:schemeClr val="dk1"/>
+            </a:lnRef>
+            <a:fillRef idx="1">
+              <a:schemeClr val="lt1"/>
+            </a:fillRef>
+            <a:effectRef idx="0">
+              <a:schemeClr val="dk1"/>
+            </a:effectRef>
+            <a:fontRef idx="minor">
+              <a:schemeClr val="dk1"/>
+            </a:fontRef>
+          </p:style>
+        </p:cxnSp>
+      </p:grpSp>
+      <p:sp>
+        <p:nvSpPr>
+          <p:cNvPr id="52" name="CuadroTexto 51">
+            <a:extLst>
+              <a:ext uri="{FF2B5EF4-FFF2-40B4-BE49-F238E27FC236}">
+                <a16:creationId xmlns:a16="http://schemas.microsoft.com/office/drawing/2014/main" id="{53F5586E-2DDC-D80C-0216-65CBAFE58DD5}"/>
+              </a:ext>
+            </a:extLst>
+          </p:cNvPr>
+          <p:cNvSpPr txBox="1"/>
+          <p:nvPr/>
+        </p:nvSpPr>
+        <p:spPr>
+          <a:xfrm>
+            <a:off x="1785495" y="4719870"/>
+            <a:ext cx="394582" cy="153888"/>
+          </a:xfrm>
+          <a:prstGeom prst="rect">
+            <a:avLst/>
+          </a:prstGeom>
+          <a:noFill/>
+        </p:spPr>
+        <p:txBody>
+          <a:bodyPr wrap="square" rtlCol="0">
+            <a:spAutoFit/>
+          </a:bodyPr>
+          <a:lstStyle/>
+          <a:p>
+            <a:r>
+              <a:rPr lang="es-ES" sz="400" dirty="0"/>
+              <a:t>Piloto Luz</a:t>
+            </a:r>
+          </a:p>
+        </p:txBody>
+      </p:sp>
+      <p:grpSp>
+        <p:nvGrpSpPr>
+          <p:cNvPr id="54" name="Grupo 53">
+            <a:extLst>
+              <a:ext uri="{FF2B5EF4-FFF2-40B4-BE49-F238E27FC236}">
+                <a16:creationId xmlns:a16="http://schemas.microsoft.com/office/drawing/2014/main" id="{2119A96A-7B9E-A847-8B8D-2D57DC01AA62}"/>
+              </a:ext>
+            </a:extLst>
+          </p:cNvPr>
+          <p:cNvGrpSpPr/>
+          <p:nvPr/>
+        </p:nvGrpSpPr>
+        <p:grpSpPr>
+          <a:xfrm>
+            <a:off x="1684153" y="4936023"/>
+            <a:ext cx="159603" cy="159603"/>
+            <a:chOff x="2649165" y="3816350"/>
+            <a:chExt cx="159603" cy="159603"/>
+          </a:xfrm>
+        </p:grpSpPr>
+        <p:sp>
+          <p:nvSpPr>
+            <p:cNvPr id="55" name="Elipse 54">
+              <a:extLst>
+                <a:ext uri="{FF2B5EF4-FFF2-40B4-BE49-F238E27FC236}">
+                  <a16:creationId xmlns:a16="http://schemas.microsoft.com/office/drawing/2014/main" id="{E5BF1195-CADE-EA0C-B151-F275DAD1935C}"/>
+                </a:ext>
+              </a:extLst>
+            </p:cNvPr>
+            <p:cNvSpPr/>
+            <p:nvPr/>
+          </p:nvSpPr>
+          <p:spPr>
+            <a:xfrm>
+              <a:off x="2649165" y="3816350"/>
+              <a:ext cx="159603" cy="159603"/>
+            </a:xfrm>
+            <a:prstGeom prst="ellipse">
+              <a:avLst/>
+            </a:prstGeom>
+          </p:spPr>
+          <p:style>
+            <a:lnRef idx="2">
+              <a:schemeClr val="dk1"/>
+            </a:lnRef>
+            <a:fillRef idx="1">
+              <a:schemeClr val="lt1"/>
+            </a:fillRef>
+            <a:effectRef idx="0">
+              <a:schemeClr val="dk1"/>
+            </a:effectRef>
+            <a:fontRef idx="minor">
+              <a:schemeClr val="dk1"/>
+            </a:fontRef>
+          </p:style>
+          <p:txBody>
+            <a:bodyPr rtlCol="0" anchor="ctr"/>
+            <a:lstStyle/>
+            <a:p>
+              <a:pPr algn="ctr"/>
+              <a:endParaRPr lang="es-ES"/>
+            </a:p>
+          </p:txBody>
+        </p:sp>
+        <p:cxnSp>
+          <p:nvCxnSpPr>
+            <p:cNvPr id="57" name="Conector recto 56">
+              <a:extLst>
+                <a:ext uri="{FF2B5EF4-FFF2-40B4-BE49-F238E27FC236}">
+                  <a16:creationId xmlns:a16="http://schemas.microsoft.com/office/drawing/2014/main" id="{4D99A799-5AFE-5C7E-B529-B1604165FF7F}"/>
+                </a:ext>
+              </a:extLst>
+            </p:cNvPr>
+            <p:cNvCxnSpPr>
+              <a:stCxn id="55" idx="1"/>
+              <a:endCxn id="55" idx="5"/>
+            </p:cNvCxnSpPr>
+            <p:nvPr/>
+          </p:nvCxnSpPr>
+          <p:spPr>
+            <a:xfrm>
+              <a:off x="2672538" y="3839723"/>
+              <a:ext cx="112857" cy="112857"/>
+            </a:xfrm>
+            <a:prstGeom prst="line">
+              <a:avLst/>
+            </a:prstGeom>
+          </p:spPr>
+          <p:style>
+            <a:lnRef idx="2">
+              <a:schemeClr val="dk1"/>
+            </a:lnRef>
+            <a:fillRef idx="1">
+              <a:schemeClr val="lt1"/>
+            </a:fillRef>
+            <a:effectRef idx="0">
+              <a:schemeClr val="dk1"/>
+            </a:effectRef>
+            <a:fontRef idx="minor">
+              <a:schemeClr val="dk1"/>
+            </a:fontRef>
+          </p:style>
+        </p:cxnSp>
+        <p:cxnSp>
+          <p:nvCxnSpPr>
+            <p:cNvPr id="58" name="Conector recto 57">
+              <a:extLst>
+                <a:ext uri="{FF2B5EF4-FFF2-40B4-BE49-F238E27FC236}">
+                  <a16:creationId xmlns:a16="http://schemas.microsoft.com/office/drawing/2014/main" id="{5479F658-EE1C-2304-6630-BE8C05B6BEB4}"/>
+                </a:ext>
+              </a:extLst>
+            </p:cNvPr>
+            <p:cNvCxnSpPr>
+              <a:stCxn id="55" idx="7"/>
+              <a:endCxn id="55" idx="3"/>
+            </p:cNvCxnSpPr>
+            <p:nvPr/>
+          </p:nvCxnSpPr>
+          <p:spPr>
+            <a:xfrm flipH="1">
+              <a:off x="2672538" y="3839723"/>
+              <a:ext cx="112857" cy="112857"/>
+            </a:xfrm>
+            <a:prstGeom prst="line">
+              <a:avLst/>
+            </a:prstGeom>
+          </p:spPr>
+          <p:style>
+            <a:lnRef idx="2">
+              <a:schemeClr val="dk1"/>
+            </a:lnRef>
+            <a:fillRef idx="1">
+              <a:schemeClr val="lt1"/>
+            </a:fillRef>
+            <a:effectRef idx="0">
+              <a:schemeClr val="dk1"/>
+            </a:effectRef>
+            <a:fontRef idx="minor">
+              <a:schemeClr val="dk1"/>
+            </a:fontRef>
+          </p:style>
+        </p:cxnSp>
+      </p:grpSp>
+      <p:sp>
+        <p:nvSpPr>
+          <p:cNvPr id="59" name="CuadroTexto 58">
+            <a:extLst>
+              <a:ext uri="{FF2B5EF4-FFF2-40B4-BE49-F238E27FC236}">
+                <a16:creationId xmlns:a16="http://schemas.microsoft.com/office/drawing/2014/main" id="{9408E3C0-BDA0-A540-62BC-E785ACA011C0}"/>
+              </a:ext>
+            </a:extLst>
+          </p:cNvPr>
+          <p:cNvSpPr txBox="1"/>
+          <p:nvPr/>
+        </p:nvSpPr>
+        <p:spPr>
+          <a:xfrm>
+            <a:off x="1786276" y="4917884"/>
+            <a:ext cx="405519" cy="153888"/>
+          </a:xfrm>
+          <a:prstGeom prst="rect">
+            <a:avLst/>
+          </a:prstGeom>
+          <a:noFill/>
+        </p:spPr>
+        <p:txBody>
+          <a:bodyPr wrap="square" rtlCol="0">
+            <a:spAutoFit/>
+          </a:bodyPr>
+          <a:lstStyle/>
+          <a:p>
+            <a:r>
+              <a:rPr lang="es-ES" sz="400" dirty="0"/>
+              <a:t>Piloto R1</a:t>
+            </a:r>
+          </a:p>
+        </p:txBody>
+      </p:sp>
+      <p:grpSp>
+        <p:nvGrpSpPr>
+          <p:cNvPr id="85" name="Grupo 84">
+            <a:extLst>
+              <a:ext uri="{FF2B5EF4-FFF2-40B4-BE49-F238E27FC236}">
+                <a16:creationId xmlns:a16="http://schemas.microsoft.com/office/drawing/2014/main" id="{7E50624F-3DA4-878B-2DCE-6A7A43C643BB}"/>
+              </a:ext>
+            </a:extLst>
+          </p:cNvPr>
+          <p:cNvGrpSpPr/>
+          <p:nvPr/>
+        </p:nvGrpSpPr>
+        <p:grpSpPr>
+          <a:xfrm>
+            <a:off x="1684396" y="5144504"/>
+            <a:ext cx="159603" cy="159603"/>
+            <a:chOff x="2649165" y="3816350"/>
+            <a:chExt cx="159603" cy="159603"/>
+          </a:xfrm>
+        </p:grpSpPr>
+        <p:sp>
+          <p:nvSpPr>
+            <p:cNvPr id="88" name="Elipse 87">
+              <a:extLst>
+                <a:ext uri="{FF2B5EF4-FFF2-40B4-BE49-F238E27FC236}">
+                  <a16:creationId xmlns:a16="http://schemas.microsoft.com/office/drawing/2014/main" id="{6ADED05C-AC6B-CFBC-5F72-88D7E9A51136}"/>
+                </a:ext>
+              </a:extLst>
+            </p:cNvPr>
+            <p:cNvSpPr/>
+            <p:nvPr/>
+          </p:nvSpPr>
+          <p:spPr>
+            <a:xfrm>
+              <a:off x="2649165" y="3816350"/>
+              <a:ext cx="159603" cy="159603"/>
+            </a:xfrm>
+            <a:prstGeom prst="ellipse">
+              <a:avLst/>
+            </a:prstGeom>
+          </p:spPr>
+          <p:style>
+            <a:lnRef idx="2">
+              <a:schemeClr val="dk1"/>
+            </a:lnRef>
+            <a:fillRef idx="1">
+              <a:schemeClr val="lt1"/>
+            </a:fillRef>
+            <a:effectRef idx="0">
+              <a:schemeClr val="dk1"/>
+            </a:effectRef>
+            <a:fontRef idx="minor">
+              <a:schemeClr val="dk1"/>
+            </a:fontRef>
+          </p:style>
+          <p:txBody>
+            <a:bodyPr rtlCol="0" anchor="ctr"/>
+            <a:lstStyle/>
+            <a:p>
+              <a:pPr algn="ctr"/>
+              <a:endParaRPr lang="es-ES"/>
+            </a:p>
+          </p:txBody>
+        </p:sp>
+        <p:cxnSp>
+          <p:nvCxnSpPr>
+            <p:cNvPr id="89" name="Conector recto 88">
+              <a:extLst>
+                <a:ext uri="{FF2B5EF4-FFF2-40B4-BE49-F238E27FC236}">
+                  <a16:creationId xmlns:a16="http://schemas.microsoft.com/office/drawing/2014/main" id="{E8D3726B-FF56-879C-F16D-9A5DFDC6765F}"/>
+                </a:ext>
+              </a:extLst>
+            </p:cNvPr>
+            <p:cNvCxnSpPr>
+              <a:stCxn id="88" idx="1"/>
+              <a:endCxn id="88" idx="5"/>
+            </p:cNvCxnSpPr>
+            <p:nvPr/>
+          </p:nvCxnSpPr>
+          <p:spPr>
+            <a:xfrm>
+              <a:off x="2672538" y="3839723"/>
+              <a:ext cx="112857" cy="112857"/>
+            </a:xfrm>
+            <a:prstGeom prst="line">
+              <a:avLst/>
+            </a:prstGeom>
+          </p:spPr>
+          <p:style>
+            <a:lnRef idx="2">
+              <a:schemeClr val="dk1"/>
+            </a:lnRef>
+            <a:fillRef idx="1">
+              <a:schemeClr val="lt1"/>
+            </a:fillRef>
+            <a:effectRef idx="0">
+              <a:schemeClr val="dk1"/>
+            </a:effectRef>
+            <a:fontRef idx="minor">
+              <a:schemeClr val="dk1"/>
+            </a:fontRef>
+          </p:style>
+        </p:cxnSp>
+        <p:cxnSp>
+          <p:nvCxnSpPr>
+            <p:cNvPr id="91" name="Conector recto 90">
+              <a:extLst>
+                <a:ext uri="{FF2B5EF4-FFF2-40B4-BE49-F238E27FC236}">
+                  <a16:creationId xmlns:a16="http://schemas.microsoft.com/office/drawing/2014/main" id="{96E727B1-1058-A63C-213A-9057ADE1A68F}"/>
+                </a:ext>
+              </a:extLst>
+            </p:cNvPr>
+            <p:cNvCxnSpPr>
+              <a:stCxn id="88" idx="7"/>
+              <a:endCxn id="88" idx="3"/>
+            </p:cNvCxnSpPr>
+            <p:nvPr/>
+          </p:nvCxnSpPr>
+          <p:spPr>
+            <a:xfrm flipH="1">
+              <a:off x="2672538" y="3839723"/>
+              <a:ext cx="112857" cy="112857"/>
+            </a:xfrm>
+            <a:prstGeom prst="line">
+              <a:avLst/>
+            </a:prstGeom>
+          </p:spPr>
+          <p:style>
+            <a:lnRef idx="2">
+              <a:schemeClr val="dk1"/>
+            </a:lnRef>
+            <a:fillRef idx="1">
+              <a:schemeClr val="lt1"/>
+            </a:fillRef>
+            <a:effectRef idx="0">
+              <a:schemeClr val="dk1"/>
+            </a:effectRef>
+            <a:fontRef idx="minor">
+              <a:schemeClr val="dk1"/>
+            </a:fontRef>
+          </p:style>
+        </p:cxnSp>
+      </p:grpSp>
+      <p:sp>
+        <p:nvSpPr>
+          <p:cNvPr id="93" name="CuadroTexto 92">
+            <a:extLst>
+              <a:ext uri="{FF2B5EF4-FFF2-40B4-BE49-F238E27FC236}">
+                <a16:creationId xmlns:a16="http://schemas.microsoft.com/office/drawing/2014/main" id="{FB8D3F8E-C398-DAFC-5D0E-DE8B4F7F6DF0}"/>
+              </a:ext>
+            </a:extLst>
+          </p:cNvPr>
+          <p:cNvSpPr txBox="1"/>
+          <p:nvPr/>
+        </p:nvSpPr>
+        <p:spPr>
+          <a:xfrm>
+            <a:off x="1786519" y="5138509"/>
+            <a:ext cx="405276" cy="153888"/>
+          </a:xfrm>
+          <a:prstGeom prst="rect">
+            <a:avLst/>
+          </a:prstGeom>
+          <a:noFill/>
+        </p:spPr>
+        <p:txBody>
+          <a:bodyPr wrap="square" rtlCol="0">
+            <a:spAutoFit/>
+          </a:bodyPr>
+          <a:lstStyle/>
+          <a:p>
+            <a:r>
+              <a:rPr lang="es-ES" sz="400" dirty="0"/>
+              <a:t>Piloto R2</a:t>
+            </a:r>
+          </a:p>
+        </p:txBody>
+      </p:sp>
+      <p:sp>
+        <p:nvSpPr>
+          <p:cNvPr id="96" name="CuadroTexto 95">
+            <a:extLst>
+              <a:ext uri="{FF2B5EF4-FFF2-40B4-BE49-F238E27FC236}">
+                <a16:creationId xmlns:a16="http://schemas.microsoft.com/office/drawing/2014/main" id="{35377DB3-7E09-317E-13AA-D0F32990862C}"/>
+              </a:ext>
+            </a:extLst>
+          </p:cNvPr>
+          <p:cNvSpPr txBox="1"/>
+          <p:nvPr/>
+        </p:nvSpPr>
+        <p:spPr>
+          <a:xfrm>
+            <a:off x="2429306" y="4411448"/>
+            <a:ext cx="694246" cy="153888"/>
+          </a:xfrm>
+          <a:prstGeom prst="rect">
+            <a:avLst/>
+          </a:prstGeom>
+          <a:noFill/>
+        </p:spPr>
+        <p:txBody>
+          <a:bodyPr wrap="square" rtlCol="0">
+            <a:spAutoFit/>
+          </a:bodyPr>
+          <a:lstStyle/>
+          <a:p>
+            <a:r>
+              <a:rPr lang="es-ES" sz="400" dirty="0"/>
+              <a:t>Teclado matricial</a:t>
+            </a:r>
+          </a:p>
+        </p:txBody>
+      </p:sp>
+      <p:cxnSp>
+        <p:nvCxnSpPr>
+          <p:cNvPr id="101" name="Conector recto 100">
+            <a:extLst>
+              <a:ext uri="{FF2B5EF4-FFF2-40B4-BE49-F238E27FC236}">
+                <a16:creationId xmlns:a16="http://schemas.microsoft.com/office/drawing/2014/main" id="{F26B99BB-E538-A873-42FF-F7CC91C0713B}"/>
               </a:ext>
             </a:extLst>
           </p:cNvPr>
           <p:cNvCxnSpPr>
-            <a:stCxn id="83" idx="0"/>
+            <a:cxnSpLocks/>
           </p:cNvCxnSpPr>
           <p:nvPr/>
         </p:nvCxnSpPr>
         <p:spPr>
-          <a:xfrm flipV="1">
-            <a:off x="1812616" y="3224502"/>
-            <a:ext cx="0" cy="1660007"/>
+          <a:xfrm flipH="1">
+            <a:off x="1747078" y="5362172"/>
+            <a:ext cx="3943" cy="834032"/>
           </a:xfrm>
           <a:prstGeom prst="line">
             <a:avLst/>
@@ -6314,13 +7242,13 @@
         </p:spPr>
         <p:style>
           <a:lnRef idx="1">
-            <a:schemeClr val="accent1"/>
+            <a:schemeClr val="dk1"/>
           </a:lnRef>
           <a:fillRef idx="0">
-            <a:schemeClr val="accent1"/>
-          </a:fillRef>
-          <a:effectRef idx="0">
-            <a:schemeClr val="accent1"/>
+            <a:schemeClr val="dk1"/>
+          </a:fillRef>
+          <a:effectRef idx="0">
+            <a:schemeClr val="dk1"/>
           </a:effectRef>
           <a:fontRef idx="minor">
             <a:schemeClr val="tx1"/>
@@ -6329,22 +7257,20 @@
       </p:cxnSp>
       <p:cxnSp>
         <p:nvCxnSpPr>
-          <p:cNvPr id="95" name="Conector recto 94">
-            <a:extLst>
-              <a:ext uri="{FF2B5EF4-FFF2-40B4-BE49-F238E27FC236}">
-                <a16:creationId xmlns:a16="http://schemas.microsoft.com/office/drawing/2014/main" id="{45BE0751-D7F8-A423-0B0D-28689AA1AD60}"/>
-              </a:ext>
-            </a:extLst>
-          </p:cNvPr>
-          <p:cNvCxnSpPr>
-            <a:stCxn id="81" idx="0"/>
-          </p:cNvCxnSpPr>
+          <p:cNvPr id="106" name="Conector recto 105">
+            <a:extLst>
+              <a:ext uri="{FF2B5EF4-FFF2-40B4-BE49-F238E27FC236}">
+                <a16:creationId xmlns:a16="http://schemas.microsoft.com/office/drawing/2014/main" id="{5656DC0B-4AC8-A38B-5FD1-B7E53711C14E}"/>
+              </a:ext>
+            </a:extLst>
+          </p:cNvPr>
+          <p:cNvCxnSpPr/>
           <p:nvPr/>
         </p:nvCxnSpPr>
         <p:spPr>
-          <a:xfrm flipV="1">
-            <a:off x="2100382" y="3224502"/>
-            <a:ext cx="0" cy="1166943"/>
+          <a:xfrm flipH="1">
+            <a:off x="1409700" y="4565336"/>
+            <a:ext cx="142357" cy="0"/>
           </a:xfrm>
           <a:prstGeom prst="line">
             <a:avLst/>
@@ -6352,13 +7278,13 @@
         </p:spPr>
         <p:style>
           <a:lnRef idx="1">
-            <a:schemeClr val="accent1"/>
+            <a:schemeClr val="dk1"/>
           </a:lnRef>
           <a:fillRef idx="0">
-            <a:schemeClr val="accent1"/>
-          </a:fillRef>
-          <a:effectRef idx="0">
-            <a:schemeClr val="accent1"/>
+            <a:schemeClr val="dk1"/>
+          </a:fillRef>
+          <a:effectRef idx="0">
+            <a:schemeClr val="dk1"/>
           </a:effectRef>
           <a:fontRef idx="minor">
             <a:schemeClr val="tx1"/>
@@ -6367,22 +7293,20 @@
       </p:cxnSp>
       <p:cxnSp>
         <p:nvCxnSpPr>
-          <p:cNvPr id="99" name="Conector recto 98">
-            <a:extLst>
-              <a:ext uri="{FF2B5EF4-FFF2-40B4-BE49-F238E27FC236}">
-                <a16:creationId xmlns:a16="http://schemas.microsoft.com/office/drawing/2014/main" id="{D3119A70-4087-9652-7B5B-14E989CD9A11}"/>
-              </a:ext>
-            </a:extLst>
-          </p:cNvPr>
-          <p:cNvCxnSpPr>
-            <a:stCxn id="80" idx="0"/>
-          </p:cNvCxnSpPr>
+          <p:cNvPr id="108" name="Conector recto 107">
+            <a:extLst>
+              <a:ext uri="{FF2B5EF4-FFF2-40B4-BE49-F238E27FC236}">
+                <a16:creationId xmlns:a16="http://schemas.microsoft.com/office/drawing/2014/main" id="{EBE3EAFA-DBBA-268B-4B74-5360AB607203}"/>
+              </a:ext>
+            </a:extLst>
+          </p:cNvPr>
+          <p:cNvCxnSpPr/>
           <p:nvPr/>
         </p:nvCxnSpPr>
         <p:spPr>
-          <a:xfrm flipH="1" flipV="1">
-            <a:off x="2378017" y="3224502"/>
-            <a:ext cx="1550" cy="706767"/>
+          <a:xfrm flipH="1">
+            <a:off x="1409700" y="4787118"/>
+            <a:ext cx="142357" cy="0"/>
           </a:xfrm>
           <a:prstGeom prst="line">
             <a:avLst/>
@@ -6390,13 +7314,13 @@
         </p:spPr>
         <p:style>
           <a:lnRef idx="1">
-            <a:schemeClr val="accent1"/>
+            <a:schemeClr val="dk1"/>
           </a:lnRef>
           <a:fillRef idx="0">
-            <a:schemeClr val="accent1"/>
-          </a:fillRef>
-          <a:effectRef idx="0">
-            <a:schemeClr val="accent1"/>
+            <a:schemeClr val="dk1"/>
+          </a:fillRef>
+          <a:effectRef idx="0">
+            <a:schemeClr val="dk1"/>
           </a:effectRef>
           <a:fontRef idx="minor">
             <a:schemeClr val="tx1"/>
@@ -6405,22 +7329,20 @@
       </p:cxnSp>
       <p:cxnSp>
         <p:nvCxnSpPr>
-          <p:cNvPr id="102" name="Conector recto 101">
-            <a:extLst>
-              <a:ext uri="{FF2B5EF4-FFF2-40B4-BE49-F238E27FC236}">
-                <a16:creationId xmlns:a16="http://schemas.microsoft.com/office/drawing/2014/main" id="{A4236C03-26E7-E779-FCE6-64B3B319FBA6}"/>
-              </a:ext>
-            </a:extLst>
-          </p:cNvPr>
-          <p:cNvCxnSpPr>
-            <a:stCxn id="78" idx="0"/>
-          </p:cNvCxnSpPr>
+          <p:cNvPr id="110" name="Conector recto 109">
+            <a:extLst>
+              <a:ext uri="{FF2B5EF4-FFF2-40B4-BE49-F238E27FC236}">
+                <a16:creationId xmlns:a16="http://schemas.microsoft.com/office/drawing/2014/main" id="{F957303A-395C-EF38-6D32-1F9F0A756828}"/>
+              </a:ext>
+            </a:extLst>
+          </p:cNvPr>
+          <p:cNvCxnSpPr/>
           <p:nvPr/>
         </p:nvCxnSpPr>
         <p:spPr>
-          <a:xfrm flipV="1">
-            <a:off x="2670860" y="3224502"/>
-            <a:ext cx="0" cy="264879"/>
+          <a:xfrm flipH="1">
+            <a:off x="1409700" y="5215549"/>
+            <a:ext cx="142357" cy="0"/>
           </a:xfrm>
           <a:prstGeom prst="line">
             <a:avLst/>
@@ -6428,13 +7350,13 @@
         </p:spPr>
         <p:style>
           <a:lnRef idx="1">
-            <a:schemeClr val="accent1"/>
+            <a:schemeClr val="dk1"/>
           </a:lnRef>
           <a:fillRef idx="0">
-            <a:schemeClr val="accent1"/>
-          </a:fillRef>
-          <a:effectRef idx="0">
-            <a:schemeClr val="accent1"/>
+            <a:schemeClr val="dk1"/>
+          </a:fillRef>
+          <a:effectRef idx="0">
+            <a:schemeClr val="dk1"/>
           </a:effectRef>
           <a:fontRef idx="minor">
             <a:schemeClr val="tx1"/>
@@ -6443,22 +7365,20 @@
       </p:cxnSp>
       <p:cxnSp>
         <p:nvCxnSpPr>
-          <p:cNvPr id="104" name="Conector recto 103">
-            <a:extLst>
-              <a:ext uri="{FF2B5EF4-FFF2-40B4-BE49-F238E27FC236}">
-                <a16:creationId xmlns:a16="http://schemas.microsoft.com/office/drawing/2014/main" id="{2EBC174E-2AAC-2281-33BE-0FE56F03E6EB}"/>
-              </a:ext>
-            </a:extLst>
-          </p:cNvPr>
-          <p:cNvCxnSpPr>
-            <a:stCxn id="78" idx="3"/>
-          </p:cNvCxnSpPr>
+          <p:cNvPr id="112" name="Conector recto 111">
+            <a:extLst>
+              <a:ext uri="{FF2B5EF4-FFF2-40B4-BE49-F238E27FC236}">
+                <a16:creationId xmlns:a16="http://schemas.microsoft.com/office/drawing/2014/main" id="{A1543CC3-5015-D01E-3491-991D5C3102E8}"/>
+              </a:ext>
+            </a:extLst>
+          </p:cNvPr>
+          <p:cNvCxnSpPr/>
           <p:nvPr/>
         </p:nvCxnSpPr>
         <p:spPr>
-          <a:xfrm flipV="1">
-            <a:off x="2909799" y="3656701"/>
-            <a:ext cx="1037423" cy="1"/>
+          <a:xfrm flipH="1">
+            <a:off x="1409700" y="5017773"/>
+            <a:ext cx="142357" cy="0"/>
           </a:xfrm>
           <a:prstGeom prst="line">
             <a:avLst/>
@@ -6466,13 +7386,13 @@
         </p:spPr>
         <p:style>
           <a:lnRef idx="1">
-            <a:schemeClr val="accent1"/>
+            <a:schemeClr val="dk1"/>
           </a:lnRef>
           <a:fillRef idx="0">
-            <a:schemeClr val="accent1"/>
-          </a:fillRef>
-          <a:effectRef idx="0">
-            <a:schemeClr val="accent1"/>
+            <a:schemeClr val="dk1"/>
+          </a:fillRef>
+          <a:effectRef idx="0">
+            <a:schemeClr val="dk1"/>
           </a:effectRef>
           <a:fontRef idx="minor">
             <a:schemeClr val="tx1"/>
@@ -6481,20 +7401,22 @@
       </p:cxnSp>
       <p:cxnSp>
         <p:nvCxnSpPr>
-          <p:cNvPr id="107" name="Conector recto 106">
-            <a:extLst>
-              <a:ext uri="{FF2B5EF4-FFF2-40B4-BE49-F238E27FC236}">
-                <a16:creationId xmlns:a16="http://schemas.microsoft.com/office/drawing/2014/main" id="{50731E3C-7B2E-3068-4D59-959143D7D0B2}"/>
-              </a:ext>
-            </a:extLst>
-          </p:cNvPr>
-          <p:cNvCxnSpPr/>
+          <p:cNvPr id="115" name="Conector recto 114">
+            <a:extLst>
+              <a:ext uri="{FF2B5EF4-FFF2-40B4-BE49-F238E27FC236}">
+                <a16:creationId xmlns:a16="http://schemas.microsoft.com/office/drawing/2014/main" id="{2C9910BD-2134-B837-8605-57A20E662500}"/>
+              </a:ext>
+            </a:extLst>
+          </p:cNvPr>
+          <p:cNvCxnSpPr>
+            <a:cxnSpLocks/>
+          </p:cNvCxnSpPr>
           <p:nvPr/>
         </p:nvCxnSpPr>
         <p:spPr>
           <a:xfrm>
-            <a:off x="2670860" y="4098589"/>
-            <a:ext cx="1287033" cy="0"/>
+            <a:off x="3242841" y="4698138"/>
+            <a:ext cx="704381" cy="0"/>
           </a:xfrm>
           <a:prstGeom prst="line">
             <a:avLst/>
@@ -6502,13 +7424,13 @@
         </p:spPr>
         <p:style>
           <a:lnRef idx="1">
-            <a:schemeClr val="accent1"/>
+            <a:schemeClr val="dk1"/>
           </a:lnRef>
           <a:fillRef idx="0">
-            <a:schemeClr val="accent1"/>
-          </a:fillRef>
-          <a:effectRef idx="0">
-            <a:schemeClr val="accent1"/>
+            <a:schemeClr val="dk1"/>
+          </a:fillRef>
+          <a:effectRef idx="0">
+            <a:schemeClr val="dk1"/>
           </a:effectRef>
           <a:fontRef idx="minor">
             <a:schemeClr val="tx1"/>
@@ -6517,22 +7439,22 @@
       </p:cxnSp>
       <p:cxnSp>
         <p:nvCxnSpPr>
-          <p:cNvPr id="109" name="Conector recto 108">
-            <a:extLst>
-              <a:ext uri="{FF2B5EF4-FFF2-40B4-BE49-F238E27FC236}">
-                <a16:creationId xmlns:a16="http://schemas.microsoft.com/office/drawing/2014/main" id="{7E7782CB-1F96-5532-F82C-32FCC58EBB99}"/>
+          <p:cNvPr id="116" name="Conector recto 115">
+            <a:extLst>
+              <a:ext uri="{FF2B5EF4-FFF2-40B4-BE49-F238E27FC236}">
+                <a16:creationId xmlns:a16="http://schemas.microsoft.com/office/drawing/2014/main" id="{CEAB7671-CCC0-55E3-C9BB-461F8605647C}"/>
               </a:ext>
             </a:extLst>
           </p:cNvPr>
           <p:cNvCxnSpPr>
-            <a:stCxn id="81" idx="3"/>
+            <a:cxnSpLocks/>
           </p:cNvCxnSpPr>
           <p:nvPr/>
         </p:nvCxnSpPr>
         <p:spPr>
-          <a:xfrm flipV="1">
-            <a:off x="2339321" y="4558765"/>
-            <a:ext cx="1607901" cy="1"/>
+          <a:xfrm>
+            <a:off x="3247604" y="5108689"/>
+            <a:ext cx="699618" cy="0"/>
           </a:xfrm>
           <a:prstGeom prst="line">
             <a:avLst/>
@@ -6540,13 +7462,13 @@
         </p:spPr>
         <p:style>
           <a:lnRef idx="1">
-            <a:schemeClr val="accent1"/>
+            <a:schemeClr val="dk1"/>
           </a:lnRef>
           <a:fillRef idx="0">
-            <a:schemeClr val="accent1"/>
-          </a:fillRef>
-          <a:effectRef idx="0">
-            <a:schemeClr val="accent1"/>
+            <a:schemeClr val="dk1"/>
+          </a:fillRef>
+          <a:effectRef idx="0">
+            <a:schemeClr val="dk1"/>
           </a:effectRef>
           <a:fontRef idx="minor">
             <a:schemeClr val="tx1"/>
@@ -6555,22 +7477,20 @@
       </p:cxnSp>
       <p:cxnSp>
         <p:nvCxnSpPr>
-          <p:cNvPr id="111" name="Conector recto 110">
-            <a:extLst>
-              <a:ext uri="{FF2B5EF4-FFF2-40B4-BE49-F238E27FC236}">
-                <a16:creationId xmlns:a16="http://schemas.microsoft.com/office/drawing/2014/main" id="{35E1D0A3-798E-F64B-CD69-737ACE59070D}"/>
-              </a:ext>
-            </a:extLst>
-          </p:cNvPr>
-          <p:cNvCxnSpPr>
-            <a:stCxn id="83" idx="3"/>
-          </p:cNvCxnSpPr>
+          <p:cNvPr id="133" name="Conector recto 132">
+            <a:extLst>
+              <a:ext uri="{FF2B5EF4-FFF2-40B4-BE49-F238E27FC236}">
+                <a16:creationId xmlns:a16="http://schemas.microsoft.com/office/drawing/2014/main" id="{22FAB50F-A163-A8B3-FD53-456FFD5CDB7E}"/>
+              </a:ext>
+            </a:extLst>
+          </p:cNvPr>
+          <p:cNvCxnSpPr/>
           <p:nvPr/>
         </p:nvCxnSpPr>
         <p:spPr>
-          <a:xfrm flipV="1">
-            <a:off x="2051555" y="5051829"/>
-            <a:ext cx="1895667" cy="1"/>
+          <a:xfrm>
+            <a:off x="3055516" y="4286496"/>
+            <a:ext cx="891706" cy="0"/>
           </a:xfrm>
           <a:prstGeom prst="line">
             <a:avLst/>
@@ -6578,13 +7498,13 @@
         </p:spPr>
         <p:style>
           <a:lnRef idx="1">
-            <a:schemeClr val="accent1"/>
+            <a:schemeClr val="dk1"/>
           </a:lnRef>
           <a:fillRef idx="0">
-            <a:schemeClr val="accent1"/>
-          </a:fillRef>
-          <a:effectRef idx="0">
-            <a:schemeClr val="accent1"/>
+            <a:schemeClr val="dk1"/>
+          </a:fillRef>
+          <a:effectRef idx="0">
+            <a:schemeClr val="dk1"/>
           </a:effectRef>
           <a:fontRef idx="minor">
             <a:schemeClr val="tx1"/>
@@ -6593,20 +7513,22 @@
       </p:cxnSp>
       <p:cxnSp>
         <p:nvCxnSpPr>
-          <p:cNvPr id="119" name="Conector recto 118">
-            <a:extLst>
-              <a:ext uri="{FF2B5EF4-FFF2-40B4-BE49-F238E27FC236}">
-                <a16:creationId xmlns:a16="http://schemas.microsoft.com/office/drawing/2014/main" id="{BAE9CB31-2EC8-9412-C4A1-2D7E873BD47A}"/>
-              </a:ext>
-            </a:extLst>
-          </p:cNvPr>
-          <p:cNvCxnSpPr/>
+          <p:cNvPr id="134" name="Conector recto 133">
+            <a:extLst>
+              <a:ext uri="{FF2B5EF4-FFF2-40B4-BE49-F238E27FC236}">
+                <a16:creationId xmlns:a16="http://schemas.microsoft.com/office/drawing/2014/main" id="{52854C05-3A22-E101-3BF1-59EC55967662}"/>
+              </a:ext>
+            </a:extLst>
+          </p:cNvPr>
+          <p:cNvCxnSpPr>
+            <a:cxnSpLocks/>
+          </p:cNvCxnSpPr>
           <p:nvPr/>
         </p:nvCxnSpPr>
         <p:spPr>
-          <a:xfrm flipV="1">
-            <a:off x="1812616" y="685218"/>
-            <a:ext cx="0" cy="2539284"/>
+          <a:xfrm>
+            <a:off x="2356367" y="4102100"/>
+            <a:ext cx="1562389" cy="300"/>
           </a:xfrm>
           <a:prstGeom prst="line">
             <a:avLst/>
@@ -6614,13 +7536,648 @@
         </p:spPr>
         <p:style>
           <a:lnRef idx="1">
-            <a:schemeClr val="accent1"/>
+            <a:schemeClr val="dk1"/>
           </a:lnRef>
           <a:fillRef idx="0">
-            <a:schemeClr val="accent1"/>
-          </a:fillRef>
-          <a:effectRef idx="0">
-            <a:schemeClr val="accent1"/>
+            <a:schemeClr val="dk1"/>
+          </a:fillRef>
+          <a:effectRef idx="0">
+            <a:schemeClr val="dk1"/>
+          </a:effectRef>
+          <a:fontRef idx="minor">
+            <a:schemeClr val="tx1"/>
+          </a:fontRef>
+        </p:style>
+      </p:cxnSp>
+      <p:sp>
+        <p:nvSpPr>
+          <p:cNvPr id="142" name="CuadroTexto 141">
+            <a:extLst>
+              <a:ext uri="{FF2B5EF4-FFF2-40B4-BE49-F238E27FC236}">
+                <a16:creationId xmlns:a16="http://schemas.microsoft.com/office/drawing/2014/main" id="{EBF9D609-09EE-719A-85E9-CE75430A21F2}"/>
+              </a:ext>
+            </a:extLst>
+          </p:cNvPr>
+          <p:cNvSpPr txBox="1"/>
+          <p:nvPr/>
+        </p:nvSpPr>
+        <p:spPr>
+          <a:xfrm>
+            <a:off x="3918756" y="3990749"/>
+            <a:ext cx="696742" cy="246221"/>
+          </a:xfrm>
+          <a:prstGeom prst="rect">
+            <a:avLst/>
+          </a:prstGeom>
+          <a:noFill/>
+        </p:spPr>
+        <p:txBody>
+          <a:bodyPr wrap="square" rtlCol="0">
+            <a:spAutoFit/>
+          </a:bodyPr>
+          <a:lstStyle/>
+          <a:p>
+            <a:r>
+              <a:rPr lang="es-ES" sz="1000" dirty="0"/>
+              <a:t>DIO32*</a:t>
+            </a:r>
+          </a:p>
+        </p:txBody>
+      </p:sp>
+      <p:sp>
+        <p:nvSpPr>
+          <p:cNvPr id="143" name="CuadroTexto 142">
+            <a:extLst>
+              <a:ext uri="{FF2B5EF4-FFF2-40B4-BE49-F238E27FC236}">
+                <a16:creationId xmlns:a16="http://schemas.microsoft.com/office/drawing/2014/main" id="{BD687238-ED9F-F6D5-1CF4-2D97402E9797}"/>
+              </a:ext>
+            </a:extLst>
+          </p:cNvPr>
+          <p:cNvSpPr txBox="1"/>
+          <p:nvPr/>
+        </p:nvSpPr>
+        <p:spPr>
+          <a:xfrm>
+            <a:off x="3924951" y="4175141"/>
+            <a:ext cx="648620" cy="246221"/>
+          </a:xfrm>
+          <a:prstGeom prst="rect">
+            <a:avLst/>
+          </a:prstGeom>
+          <a:noFill/>
+        </p:spPr>
+        <p:txBody>
+          <a:bodyPr wrap="square" rtlCol="0">
+            <a:spAutoFit/>
+          </a:bodyPr>
+          <a:lstStyle/>
+          <a:p>
+            <a:r>
+              <a:rPr lang="es-ES" sz="1000" dirty="0"/>
+              <a:t>DIO33*</a:t>
+            </a:r>
+          </a:p>
+        </p:txBody>
+      </p:sp>
+      <p:sp>
+        <p:nvSpPr>
+          <p:cNvPr id="144" name="CuadroTexto 143">
+            <a:extLst>
+              <a:ext uri="{FF2B5EF4-FFF2-40B4-BE49-F238E27FC236}">
+                <a16:creationId xmlns:a16="http://schemas.microsoft.com/office/drawing/2014/main" id="{4A96CE75-6A9B-B3F8-D605-84F1EC607713}"/>
+              </a:ext>
+            </a:extLst>
+          </p:cNvPr>
+          <p:cNvSpPr txBox="1"/>
+          <p:nvPr/>
+        </p:nvSpPr>
+        <p:spPr>
+          <a:xfrm>
+            <a:off x="3886472" y="4569441"/>
+            <a:ext cx="508016" cy="246221"/>
+          </a:xfrm>
+          <a:prstGeom prst="rect">
+            <a:avLst/>
+          </a:prstGeom>
+          <a:noFill/>
+        </p:spPr>
+        <p:txBody>
+          <a:bodyPr wrap="square" rtlCol="0">
+            <a:spAutoFit/>
+          </a:bodyPr>
+          <a:lstStyle/>
+          <a:p>
+            <a:r>
+              <a:rPr lang="es-ES" sz="1000" dirty="0"/>
+              <a:t>DI34</a:t>
+            </a:r>
+          </a:p>
+        </p:txBody>
+      </p:sp>
+      <p:sp>
+        <p:nvSpPr>
+          <p:cNvPr id="145" name="CuadroTexto 144">
+            <a:extLst>
+              <a:ext uri="{FF2B5EF4-FFF2-40B4-BE49-F238E27FC236}">
+                <a16:creationId xmlns:a16="http://schemas.microsoft.com/office/drawing/2014/main" id="{60399296-A842-8231-2892-5C27961D5D2C}"/>
+              </a:ext>
+            </a:extLst>
+          </p:cNvPr>
+          <p:cNvSpPr txBox="1"/>
+          <p:nvPr/>
+        </p:nvSpPr>
+        <p:spPr>
+          <a:xfrm>
+            <a:off x="3900420" y="4982120"/>
+            <a:ext cx="508016" cy="246221"/>
+          </a:xfrm>
+          <a:prstGeom prst="rect">
+            <a:avLst/>
+          </a:prstGeom>
+          <a:noFill/>
+        </p:spPr>
+        <p:txBody>
+          <a:bodyPr wrap="square" rtlCol="0">
+            <a:spAutoFit/>
+          </a:bodyPr>
+          <a:lstStyle/>
+          <a:p>
+            <a:r>
+              <a:rPr lang="es-ES" sz="1000" dirty="0"/>
+              <a:t>DI35</a:t>
+            </a:r>
+          </a:p>
+        </p:txBody>
+      </p:sp>
+      <p:sp>
+        <p:nvSpPr>
+          <p:cNvPr id="146" name="CuadroTexto 145">
+            <a:extLst>
+              <a:ext uri="{FF2B5EF4-FFF2-40B4-BE49-F238E27FC236}">
+                <a16:creationId xmlns:a16="http://schemas.microsoft.com/office/drawing/2014/main" id="{55D89BCD-CCF8-4159-1B9A-F20A6B68AE2F}"/>
+              </a:ext>
+            </a:extLst>
+          </p:cNvPr>
+          <p:cNvSpPr txBox="1"/>
+          <p:nvPr/>
+        </p:nvSpPr>
+        <p:spPr>
+          <a:xfrm>
+            <a:off x="918628" y="4433325"/>
+            <a:ext cx="602814" cy="246221"/>
+          </a:xfrm>
+          <a:prstGeom prst="rect">
+            <a:avLst/>
+          </a:prstGeom>
+          <a:noFill/>
+        </p:spPr>
+        <p:txBody>
+          <a:bodyPr wrap="square" rtlCol="0">
+            <a:spAutoFit/>
+          </a:bodyPr>
+          <a:lstStyle/>
+          <a:p>
+            <a:r>
+              <a:rPr lang="es-ES" sz="1000" dirty="0"/>
+              <a:t>DO TBD</a:t>
+            </a:r>
+          </a:p>
+        </p:txBody>
+      </p:sp>
+      <p:sp>
+        <p:nvSpPr>
+          <p:cNvPr id="147" name="CuadroTexto 146">
+            <a:extLst>
+              <a:ext uri="{FF2B5EF4-FFF2-40B4-BE49-F238E27FC236}">
+                <a16:creationId xmlns:a16="http://schemas.microsoft.com/office/drawing/2014/main" id="{2FA7F7D6-B713-B928-A8AA-C5D111EA5572}"/>
+              </a:ext>
+            </a:extLst>
+          </p:cNvPr>
+          <p:cNvSpPr txBox="1"/>
+          <p:nvPr/>
+        </p:nvSpPr>
+        <p:spPr>
+          <a:xfrm>
+            <a:off x="975082" y="4654753"/>
+            <a:ext cx="508016" cy="246221"/>
+          </a:xfrm>
+          <a:prstGeom prst="rect">
+            <a:avLst/>
+          </a:prstGeom>
+          <a:noFill/>
+        </p:spPr>
+        <p:txBody>
+          <a:bodyPr wrap="square" rtlCol="0">
+            <a:spAutoFit/>
+          </a:bodyPr>
+          <a:lstStyle/>
+          <a:p>
+            <a:r>
+              <a:rPr lang="es-ES" sz="1000" dirty="0"/>
+              <a:t>DO27</a:t>
+            </a:r>
+          </a:p>
+        </p:txBody>
+      </p:sp>
+      <p:sp>
+        <p:nvSpPr>
+          <p:cNvPr id="148" name="CuadroTexto 147">
+            <a:extLst>
+              <a:ext uri="{FF2B5EF4-FFF2-40B4-BE49-F238E27FC236}">
+                <a16:creationId xmlns:a16="http://schemas.microsoft.com/office/drawing/2014/main" id="{05260445-9881-132E-3FF4-0742B559664E}"/>
+              </a:ext>
+            </a:extLst>
+          </p:cNvPr>
+          <p:cNvSpPr txBox="1"/>
+          <p:nvPr/>
+        </p:nvSpPr>
+        <p:spPr>
+          <a:xfrm>
+            <a:off x="973974" y="4873758"/>
+            <a:ext cx="508016" cy="246221"/>
+          </a:xfrm>
+          <a:prstGeom prst="rect">
+            <a:avLst/>
+          </a:prstGeom>
+          <a:noFill/>
+        </p:spPr>
+        <p:txBody>
+          <a:bodyPr wrap="square" rtlCol="0">
+            <a:spAutoFit/>
+          </a:bodyPr>
+          <a:lstStyle/>
+          <a:p>
+            <a:r>
+              <a:rPr lang="es-ES" sz="1000" dirty="0"/>
+              <a:t>DO26</a:t>
+            </a:r>
+          </a:p>
+        </p:txBody>
+      </p:sp>
+      <p:sp>
+        <p:nvSpPr>
+          <p:cNvPr id="149" name="CuadroTexto 148">
+            <a:extLst>
+              <a:ext uri="{FF2B5EF4-FFF2-40B4-BE49-F238E27FC236}">
+                <a16:creationId xmlns:a16="http://schemas.microsoft.com/office/drawing/2014/main" id="{B5A6D711-2527-A675-96DF-349EEBD5D693}"/>
+              </a:ext>
+            </a:extLst>
+          </p:cNvPr>
+          <p:cNvSpPr txBox="1"/>
+          <p:nvPr/>
+        </p:nvSpPr>
+        <p:spPr>
+          <a:xfrm>
+            <a:off x="984225" y="5099102"/>
+            <a:ext cx="508016" cy="246221"/>
+          </a:xfrm>
+          <a:prstGeom prst="rect">
+            <a:avLst/>
+          </a:prstGeom>
+          <a:noFill/>
+        </p:spPr>
+        <p:txBody>
+          <a:bodyPr wrap="square" rtlCol="0">
+            <a:spAutoFit/>
+          </a:bodyPr>
+          <a:lstStyle/>
+          <a:p>
+            <a:r>
+              <a:rPr lang="es-ES" sz="1000" dirty="0"/>
+              <a:t>DO25</a:t>
+            </a:r>
+          </a:p>
+        </p:txBody>
+      </p:sp>
+      <p:sp>
+        <p:nvSpPr>
+          <p:cNvPr id="150" name="Rectángulo 149">
+            <a:extLst>
+              <a:ext uri="{FF2B5EF4-FFF2-40B4-BE49-F238E27FC236}">
+                <a16:creationId xmlns:a16="http://schemas.microsoft.com/office/drawing/2014/main" id="{1C3C64B3-A744-9A9C-1940-0AA291654C79}"/>
+              </a:ext>
+            </a:extLst>
+          </p:cNvPr>
+          <p:cNvSpPr/>
+          <p:nvPr/>
+        </p:nvSpPr>
+        <p:spPr>
+          <a:xfrm>
+            <a:off x="8854095" y="4236969"/>
+            <a:ext cx="2964180" cy="1469663"/>
+          </a:xfrm>
+          <a:prstGeom prst="rect">
+            <a:avLst/>
+          </a:prstGeom>
+          <a:noFill/>
+          <a:ln w="9525" cap="flat" cmpd="sng" algn="ctr">
+            <a:solidFill>
+              <a:schemeClr val="dk1"/>
+            </a:solidFill>
+            <a:prstDash val="dash"/>
+            <a:round/>
+            <a:headEnd type="none" w="med" len="med"/>
+            <a:tailEnd type="none" w="med" len="med"/>
+          </a:ln>
+        </p:spPr>
+        <p:style>
+          <a:lnRef idx="0">
+            <a:scrgbClr r="0" g="0" b="0"/>
+          </a:lnRef>
+          <a:fillRef idx="0">
+            <a:scrgbClr r="0" g="0" b="0"/>
+          </a:fillRef>
+          <a:effectRef idx="0">
+            <a:scrgbClr r="0" g="0" b="0"/>
+          </a:effectRef>
+          <a:fontRef idx="minor">
+            <a:schemeClr val="dk1"/>
+          </a:fontRef>
+        </p:style>
+        <p:txBody>
+          <a:bodyPr rtlCol="0" anchor="t"/>
+          <a:lstStyle/>
+          <a:p>
+            <a:pPr algn="ctr"/>
+            <a:r>
+              <a:rPr lang="es-ES" sz="1200" dirty="0"/>
+              <a:t>Placa de Potencia</a:t>
+            </a:r>
+          </a:p>
+        </p:txBody>
+      </p:sp>
+      <p:sp>
+        <p:nvSpPr>
+          <p:cNvPr id="151" name="Rectángulo 150">
+            <a:extLst>
+              <a:ext uri="{FF2B5EF4-FFF2-40B4-BE49-F238E27FC236}">
+                <a16:creationId xmlns:a16="http://schemas.microsoft.com/office/drawing/2014/main" id="{B11AFB06-EEAA-9C2C-11A2-5CA29F4B06B1}"/>
+              </a:ext>
+            </a:extLst>
+          </p:cNvPr>
+          <p:cNvSpPr/>
+          <p:nvPr/>
+        </p:nvSpPr>
+        <p:spPr>
+          <a:xfrm>
+            <a:off x="5507203" y="1520718"/>
+            <a:ext cx="1145120" cy="985056"/>
+          </a:xfrm>
+          <a:prstGeom prst="rect">
+            <a:avLst/>
+          </a:prstGeom>
+          <a:noFill/>
+          <a:ln w="9525" cap="flat" cmpd="sng" algn="ctr">
+            <a:solidFill>
+              <a:schemeClr val="dk1"/>
+            </a:solidFill>
+            <a:prstDash val="dash"/>
+            <a:round/>
+            <a:headEnd type="none" w="med" len="med"/>
+            <a:tailEnd type="none" w="med" len="med"/>
+          </a:ln>
+        </p:spPr>
+        <p:style>
+          <a:lnRef idx="0">
+            <a:scrgbClr r="0" g="0" b="0"/>
+          </a:lnRef>
+          <a:fillRef idx="0">
+            <a:scrgbClr r="0" g="0" b="0"/>
+          </a:fillRef>
+          <a:effectRef idx="0">
+            <a:scrgbClr r="0" g="0" b="0"/>
+          </a:effectRef>
+          <a:fontRef idx="minor">
+            <a:schemeClr val="dk1"/>
+          </a:fontRef>
+        </p:style>
+        <p:txBody>
+          <a:bodyPr rtlCol="0" anchor="t"/>
+          <a:lstStyle/>
+          <a:p>
+            <a:pPr algn="ctr"/>
+            <a:r>
+              <a:rPr lang="es-ES" sz="1200" dirty="0"/>
+              <a:t>Placa de Potencia</a:t>
+            </a:r>
+          </a:p>
+        </p:txBody>
+      </p:sp>
+      <p:sp>
+        <p:nvSpPr>
+          <p:cNvPr id="152" name="CuadroTexto 151">
+            <a:extLst>
+              <a:ext uri="{FF2B5EF4-FFF2-40B4-BE49-F238E27FC236}">
+                <a16:creationId xmlns:a16="http://schemas.microsoft.com/office/drawing/2014/main" id="{1C82517C-9C05-5F57-A2E7-F232BE326AEC}"/>
+              </a:ext>
+            </a:extLst>
+          </p:cNvPr>
+          <p:cNvSpPr txBox="1"/>
+          <p:nvPr/>
+        </p:nvSpPr>
+        <p:spPr>
+          <a:xfrm>
+            <a:off x="2238511" y="2565220"/>
+            <a:ext cx="857755" cy="369332"/>
+          </a:xfrm>
+          <a:prstGeom prst="rect">
+            <a:avLst/>
+          </a:prstGeom>
+          <a:noFill/>
+        </p:spPr>
+        <p:txBody>
+          <a:bodyPr wrap="square" rtlCol="0">
+            <a:spAutoFit/>
+          </a:bodyPr>
+          <a:lstStyle/>
+          <a:p>
+            <a:r>
+              <a:rPr lang="es-ES" dirty="0"/>
+              <a:t>5 V</a:t>
+            </a:r>
+          </a:p>
+        </p:txBody>
+      </p:sp>
+      <p:sp>
+        <p:nvSpPr>
+          <p:cNvPr id="153" name="Rectángulo 152">
+            <a:extLst>
+              <a:ext uri="{FF2B5EF4-FFF2-40B4-BE49-F238E27FC236}">
+                <a16:creationId xmlns:a16="http://schemas.microsoft.com/office/drawing/2014/main" id="{6A8CCBA0-D375-2D75-0D10-3E72E3FB295B}"/>
+              </a:ext>
+            </a:extLst>
+          </p:cNvPr>
+          <p:cNvSpPr/>
+          <p:nvPr/>
+        </p:nvSpPr>
+        <p:spPr>
+          <a:xfrm>
+            <a:off x="13383" y="2460423"/>
+            <a:ext cx="1448558" cy="1644978"/>
+          </a:xfrm>
+          <a:prstGeom prst="rect">
+            <a:avLst/>
+          </a:prstGeom>
+          <a:noFill/>
+          <a:ln w="9525" cap="flat" cmpd="sng" algn="ctr">
+            <a:solidFill>
+              <a:schemeClr val="dk1"/>
+            </a:solidFill>
+            <a:prstDash val="dash"/>
+            <a:round/>
+            <a:headEnd type="none" w="med" len="med"/>
+            <a:tailEnd type="none" w="med" len="med"/>
+          </a:ln>
+        </p:spPr>
+        <p:style>
+          <a:lnRef idx="0">
+            <a:scrgbClr r="0" g="0" b="0"/>
+          </a:lnRef>
+          <a:fillRef idx="0">
+            <a:scrgbClr r="0" g="0" b="0"/>
+          </a:fillRef>
+          <a:effectRef idx="0">
+            <a:scrgbClr r="0" g="0" b="0"/>
+          </a:effectRef>
+          <a:fontRef idx="minor">
+            <a:schemeClr val="dk1"/>
+          </a:fontRef>
+        </p:style>
+        <p:txBody>
+          <a:bodyPr rtlCol="0" anchor="t"/>
+          <a:lstStyle/>
+          <a:p>
+            <a:pPr algn="ctr"/>
+            <a:r>
+              <a:rPr lang="es-ES" sz="1200" dirty="0"/>
+              <a:t>Placa de Potencia</a:t>
+            </a:r>
+          </a:p>
+        </p:txBody>
+      </p:sp>
+      <p:sp>
+        <p:nvSpPr>
+          <p:cNvPr id="154" name="Rectángulo 153">
+            <a:extLst>
+              <a:ext uri="{FF2B5EF4-FFF2-40B4-BE49-F238E27FC236}">
+                <a16:creationId xmlns:a16="http://schemas.microsoft.com/office/drawing/2014/main" id="{E541F0C5-9398-158A-C66A-C2F68E484893}"/>
+              </a:ext>
+            </a:extLst>
+          </p:cNvPr>
+          <p:cNvSpPr/>
+          <p:nvPr/>
+        </p:nvSpPr>
+        <p:spPr>
+          <a:xfrm>
+            <a:off x="7296601" y="2538761"/>
+            <a:ext cx="4882015" cy="1657766"/>
+          </a:xfrm>
+          <a:prstGeom prst="rect">
+            <a:avLst/>
+          </a:prstGeom>
+          <a:noFill/>
+          <a:ln w="9525" cap="flat" cmpd="sng" algn="ctr">
+            <a:solidFill>
+              <a:schemeClr val="dk1"/>
+            </a:solidFill>
+            <a:prstDash val="dash"/>
+            <a:round/>
+            <a:headEnd type="none" w="med" len="med"/>
+            <a:tailEnd type="none" w="med" len="med"/>
+          </a:ln>
+        </p:spPr>
+        <p:style>
+          <a:lnRef idx="0">
+            <a:scrgbClr r="0" g="0" b="0"/>
+          </a:lnRef>
+          <a:fillRef idx="0">
+            <a:scrgbClr r="0" g="0" b="0"/>
+          </a:fillRef>
+          <a:effectRef idx="0">
+            <a:scrgbClr r="0" g="0" b="0"/>
+          </a:effectRef>
+          <a:fontRef idx="minor">
+            <a:schemeClr val="dk1"/>
+          </a:fontRef>
+        </p:style>
+        <p:txBody>
+          <a:bodyPr rtlCol="0" anchor="t"/>
+          <a:lstStyle/>
+          <a:p>
+            <a:pPr algn="ctr"/>
+            <a:r>
+              <a:rPr lang="es-ES" sz="1200" dirty="0"/>
+              <a:t>Invernadero</a:t>
+            </a:r>
+          </a:p>
+        </p:txBody>
+      </p:sp>
+      <p:sp>
+        <p:nvSpPr>
+          <p:cNvPr id="155" name="Rectángulo 154">
+            <a:extLst>
+              <a:ext uri="{FF2B5EF4-FFF2-40B4-BE49-F238E27FC236}">
+                <a16:creationId xmlns:a16="http://schemas.microsoft.com/office/drawing/2014/main" id="{CEF76ACC-D3D2-4B6D-B328-7518D53AFC6C}"/>
+              </a:ext>
+            </a:extLst>
+          </p:cNvPr>
+          <p:cNvSpPr/>
+          <p:nvPr/>
+        </p:nvSpPr>
+        <p:spPr>
+          <a:xfrm>
+            <a:off x="4093884" y="1084076"/>
+            <a:ext cx="607285" cy="304485"/>
+          </a:xfrm>
+          <a:prstGeom prst="rect">
+            <a:avLst/>
+          </a:prstGeom>
+        </p:spPr>
+        <p:style>
+          <a:lnRef idx="2">
+            <a:schemeClr val="dk1"/>
+          </a:lnRef>
+          <a:fillRef idx="1">
+            <a:schemeClr val="lt1"/>
+          </a:fillRef>
+          <a:effectRef idx="0">
+            <a:schemeClr val="dk1"/>
+          </a:effectRef>
+          <a:fontRef idx="minor">
+            <a:schemeClr val="dk1"/>
+          </a:fontRef>
+        </p:style>
+        <p:txBody>
+          <a:bodyPr rtlCol="0" anchor="ctr"/>
+          <a:lstStyle/>
+          <a:p>
+            <a:pPr algn="ctr"/>
+            <a:r>
+              <a:rPr lang="es-ES" sz="1000" dirty="0"/>
+              <a:t>LTO 3.3</a:t>
+            </a:r>
+          </a:p>
+        </p:txBody>
+      </p:sp>
+      <p:cxnSp>
+        <p:nvCxnSpPr>
+          <p:cNvPr id="156" name="Conector recto 155">
+            <a:extLst>
+              <a:ext uri="{FF2B5EF4-FFF2-40B4-BE49-F238E27FC236}">
+                <a16:creationId xmlns:a16="http://schemas.microsoft.com/office/drawing/2014/main" id="{BB66F514-0A91-F60C-BA6E-766D6246A077}"/>
+              </a:ext>
+            </a:extLst>
+          </p:cNvPr>
+          <p:cNvCxnSpPr>
+            <a:cxnSpLocks/>
+            <a:endCxn id="155" idx="2"/>
+          </p:cNvCxnSpPr>
+          <p:nvPr/>
+        </p:nvCxnSpPr>
+        <p:spPr>
+          <a:xfrm flipH="1" flipV="1">
+            <a:off x="4397527" y="1388561"/>
+            <a:ext cx="2799" cy="1463790"/>
+          </a:xfrm>
+          <a:prstGeom prst="line">
+            <a:avLst/>
+          </a:prstGeom>
+          <a:ln>
+            <a:solidFill>
+              <a:srgbClr val="FF0000"/>
+            </a:solidFill>
+            <a:prstDash val="dash"/>
+          </a:ln>
+        </p:spPr>
+        <p:style>
+          <a:lnRef idx="3">
+            <a:schemeClr val="accent2"/>
+          </a:lnRef>
+          <a:fillRef idx="0">
+            <a:schemeClr val="accent2"/>
+          </a:fillRef>
+          <a:effectRef idx="2">
+            <a:schemeClr val="accent2"/>
           </a:effectRef>
           <a:fontRef idx="minor">
             <a:schemeClr val="tx1"/>
@@ -6629,332 +8186,173 @@
       </p:cxnSp>
       <p:cxnSp>
         <p:nvCxnSpPr>
-          <p:cNvPr id="130" name="Conector recto 129">
-            <a:extLst>
-              <a:ext uri="{FF2B5EF4-FFF2-40B4-BE49-F238E27FC236}">
-                <a16:creationId xmlns:a16="http://schemas.microsoft.com/office/drawing/2014/main" id="{645D8F40-5286-28A3-14CE-84CDB302C896}"/>
-              </a:ext>
-            </a:extLst>
-          </p:cNvPr>
-          <p:cNvCxnSpPr/>
+          <p:cNvPr id="160" name="Conector recto 159">
+            <a:extLst>
+              <a:ext uri="{FF2B5EF4-FFF2-40B4-BE49-F238E27FC236}">
+                <a16:creationId xmlns:a16="http://schemas.microsoft.com/office/drawing/2014/main" id="{5B911DCD-0D9E-46C8-9D93-102BFE42F3EF}"/>
+              </a:ext>
+            </a:extLst>
+          </p:cNvPr>
+          <p:cNvCxnSpPr>
+            <a:cxnSpLocks/>
+            <a:endCxn id="75" idx="3"/>
+          </p:cNvCxnSpPr>
           <p:nvPr/>
         </p:nvCxnSpPr>
         <p:spPr>
           <a:xfrm>
-            <a:off x="2478405" y="5051829"/>
-            <a:ext cx="0" cy="1176820"/>
+            <a:off x="3947222" y="2851964"/>
+            <a:ext cx="474619" cy="1041"/>
           </a:xfrm>
           <a:prstGeom prst="line">
             <a:avLst/>
           </a:prstGeom>
-        </p:spPr>
-        <p:style>
-          <a:lnRef idx="1">
-            <a:schemeClr val="accent1"/>
+          <a:ln>
+            <a:solidFill>
+              <a:srgbClr val="FF0000"/>
+            </a:solidFill>
+            <a:prstDash val="dash"/>
+          </a:ln>
+        </p:spPr>
+        <p:style>
+          <a:lnRef idx="3">
+            <a:schemeClr val="accent2"/>
           </a:lnRef>
           <a:fillRef idx="0">
-            <a:schemeClr val="accent1"/>
-          </a:fillRef>
-          <a:effectRef idx="0">
-            <a:schemeClr val="accent1"/>
+            <a:schemeClr val="accent2"/>
+          </a:fillRef>
+          <a:effectRef idx="2">
+            <a:schemeClr val="accent2"/>
           </a:effectRef>
           <a:fontRef idx="minor">
             <a:schemeClr val="tx1"/>
           </a:fontRef>
         </p:style>
       </p:cxnSp>
-      <p:cxnSp>
-        <p:nvCxnSpPr>
-          <p:cNvPr id="132" name="Conector recto 131">
-            <a:extLst>
-              <a:ext uri="{FF2B5EF4-FFF2-40B4-BE49-F238E27FC236}">
-                <a16:creationId xmlns:a16="http://schemas.microsoft.com/office/drawing/2014/main" id="{3440FB7E-E64C-9662-7178-60270330295E}"/>
-              </a:ext>
-            </a:extLst>
-          </p:cNvPr>
-          <p:cNvCxnSpPr/>
-          <p:nvPr/>
-        </p:nvCxnSpPr>
-        <p:spPr>
-          <a:xfrm flipV="1">
-            <a:off x="2896148" y="4649507"/>
-            <a:ext cx="0" cy="1579142"/>
-          </a:xfrm>
-          <a:prstGeom prst="line">
-            <a:avLst/>
-          </a:prstGeom>
-        </p:spPr>
-        <p:style>
-          <a:lnRef idx="1">
-            <a:schemeClr val="accent1"/>
+      <p:sp>
+        <p:nvSpPr>
+          <p:cNvPr id="75" name="CuadroTexto 74">
+            <a:extLst>
+              <a:ext uri="{FF2B5EF4-FFF2-40B4-BE49-F238E27FC236}">
+                <a16:creationId xmlns:a16="http://schemas.microsoft.com/office/drawing/2014/main" id="{1E184B83-2DA4-1C86-9CF4-2E215CCF3E71}"/>
+              </a:ext>
+            </a:extLst>
+          </p:cNvPr>
+          <p:cNvSpPr txBox="1"/>
+          <p:nvPr/>
+        </p:nvSpPr>
+        <p:spPr>
+          <a:xfrm>
+            <a:off x="3948720" y="2729894"/>
+            <a:ext cx="473121" cy="246221"/>
+          </a:xfrm>
+          <a:prstGeom prst="rect">
+            <a:avLst/>
+          </a:prstGeom>
+          <a:noFill/>
+        </p:spPr>
+        <p:txBody>
+          <a:bodyPr wrap="square" rtlCol="0">
+            <a:spAutoFit/>
+          </a:bodyPr>
+          <a:lstStyle/>
+          <a:p>
+            <a:r>
+              <a:rPr lang="es-ES" sz="1000"/>
+              <a:t>5V</a:t>
+            </a:r>
+            <a:endParaRPr lang="es-ES" sz="1000" dirty="0"/>
+          </a:p>
+        </p:txBody>
+      </p:sp>
+      <p:sp>
+        <p:nvSpPr>
+          <p:cNvPr id="167" name="CuadroTexto 166">
+            <a:extLst>
+              <a:ext uri="{FF2B5EF4-FFF2-40B4-BE49-F238E27FC236}">
+                <a16:creationId xmlns:a16="http://schemas.microsoft.com/office/drawing/2014/main" id="{A07536F9-97B1-C708-ECAB-547E36F2B955}"/>
+              </a:ext>
+            </a:extLst>
+          </p:cNvPr>
+          <p:cNvSpPr txBox="1"/>
+          <p:nvPr/>
+        </p:nvSpPr>
+        <p:spPr>
+          <a:xfrm>
+            <a:off x="1547866" y="4228518"/>
+            <a:ext cx="791505" cy="230832"/>
+          </a:xfrm>
+          <a:prstGeom prst="rect">
+            <a:avLst/>
+          </a:prstGeom>
+          <a:noFill/>
+        </p:spPr>
+        <p:txBody>
+          <a:bodyPr wrap="square" rtlCol="0">
+            <a:spAutoFit/>
+          </a:bodyPr>
+          <a:lstStyle/>
+          <a:p>
+            <a:r>
+              <a:rPr lang="es-ES" sz="900" dirty="0"/>
+              <a:t>BOTONERA</a:t>
+            </a:r>
+          </a:p>
+        </p:txBody>
+      </p:sp>
+      <p:sp>
+        <p:nvSpPr>
+          <p:cNvPr id="168" name="Rectángulo 167">
+            <a:extLst>
+              <a:ext uri="{FF2B5EF4-FFF2-40B4-BE49-F238E27FC236}">
+                <a16:creationId xmlns:a16="http://schemas.microsoft.com/office/drawing/2014/main" id="{4445ED11-EAD7-B3F9-7751-D918CBB516D4}"/>
+              </a:ext>
+            </a:extLst>
+          </p:cNvPr>
+          <p:cNvSpPr/>
+          <p:nvPr/>
+        </p:nvSpPr>
+        <p:spPr>
+          <a:xfrm>
+            <a:off x="5489586" y="785842"/>
+            <a:ext cx="1145844" cy="710921"/>
+          </a:xfrm>
+          <a:prstGeom prst="rect">
+            <a:avLst/>
+          </a:prstGeom>
+          <a:noFill/>
+          <a:ln w="9525" cap="flat" cmpd="sng" algn="ctr">
+            <a:solidFill>
+              <a:schemeClr val="dk1"/>
+            </a:solidFill>
+            <a:prstDash val="dash"/>
+            <a:round/>
+            <a:headEnd type="none" w="med" len="med"/>
+            <a:tailEnd type="none" w="med" len="med"/>
+          </a:ln>
+        </p:spPr>
+        <p:style>
+          <a:lnRef idx="0">
+            <a:scrgbClr r="0" g="0" b="0"/>
           </a:lnRef>
           <a:fillRef idx="0">
-            <a:schemeClr val="accent1"/>
-          </a:fillRef>
-          <a:effectRef idx="0">
-            <a:schemeClr val="accent1"/>
-          </a:effectRef>
-          <a:fontRef idx="minor">
-            <a:schemeClr val="tx1"/>
-          </a:fontRef>
-        </p:style>
-      </p:cxnSp>
-      <p:cxnSp>
-        <p:nvCxnSpPr>
-          <p:cNvPr id="135" name="Conector recto 134">
-            <a:extLst>
-              <a:ext uri="{FF2B5EF4-FFF2-40B4-BE49-F238E27FC236}">
-                <a16:creationId xmlns:a16="http://schemas.microsoft.com/office/drawing/2014/main" id="{3DDB2A01-078F-9394-A491-07B437C6D9CE}"/>
-              </a:ext>
-            </a:extLst>
-          </p:cNvPr>
-          <p:cNvCxnSpPr/>
-          <p:nvPr/>
-        </p:nvCxnSpPr>
-        <p:spPr>
-          <a:xfrm flipV="1">
-            <a:off x="3258561" y="4054505"/>
-            <a:ext cx="0" cy="2154746"/>
-          </a:xfrm>
-          <a:prstGeom prst="line">
-            <a:avLst/>
-          </a:prstGeom>
-        </p:spPr>
-        <p:style>
-          <a:lnRef idx="1">
-            <a:schemeClr val="accent1"/>
-          </a:lnRef>
-          <a:fillRef idx="0">
-            <a:schemeClr val="accent1"/>
-          </a:fillRef>
-          <a:effectRef idx="0">
-            <a:schemeClr val="accent1"/>
-          </a:effectRef>
-          <a:fontRef idx="minor">
-            <a:schemeClr val="tx1"/>
-          </a:fontRef>
-        </p:style>
-      </p:cxnSp>
-      <p:cxnSp>
-        <p:nvCxnSpPr>
-          <p:cNvPr id="137" name="Conector recto 136">
-            <a:extLst>
-              <a:ext uri="{FF2B5EF4-FFF2-40B4-BE49-F238E27FC236}">
-                <a16:creationId xmlns:a16="http://schemas.microsoft.com/office/drawing/2014/main" id="{5265874F-414A-05D5-4007-1B6571941025}"/>
-              </a:ext>
-            </a:extLst>
-          </p:cNvPr>
-          <p:cNvCxnSpPr/>
-          <p:nvPr/>
-        </p:nvCxnSpPr>
-        <p:spPr>
-          <a:xfrm flipV="1">
-            <a:off x="3640010" y="3656701"/>
-            <a:ext cx="0" cy="2571948"/>
-          </a:xfrm>
-          <a:prstGeom prst="line">
-            <a:avLst/>
-          </a:prstGeom>
-        </p:spPr>
-        <p:style>
-          <a:lnRef idx="1">
-            <a:schemeClr val="accent1"/>
-          </a:lnRef>
-          <a:fillRef idx="0">
-            <a:schemeClr val="accent1"/>
-          </a:fillRef>
-          <a:effectRef idx="0">
-            <a:schemeClr val="accent1"/>
-          </a:effectRef>
-          <a:fontRef idx="minor">
-            <a:schemeClr val="tx1"/>
-          </a:fontRef>
-        </p:style>
-      </p:cxnSp>
-      <p:sp>
-        <p:nvSpPr>
-          <p:cNvPr id="120" name="Rectángulo 119">
-            <a:extLst>
-              <a:ext uri="{FF2B5EF4-FFF2-40B4-BE49-F238E27FC236}">
-                <a16:creationId xmlns:a16="http://schemas.microsoft.com/office/drawing/2014/main" id="{771B2794-481B-CBA2-1A85-DD3DE0E276AF}"/>
-              </a:ext>
-            </a:extLst>
-          </p:cNvPr>
-          <p:cNvSpPr/>
-          <p:nvPr/>
-        </p:nvSpPr>
-        <p:spPr>
-          <a:xfrm rot="16200000">
-            <a:off x="2241845" y="5664635"/>
-            <a:ext cx="473121" cy="162388"/>
-          </a:xfrm>
-          <a:prstGeom prst="rect">
-            <a:avLst/>
-          </a:prstGeom>
-        </p:spPr>
-        <p:style>
-          <a:lnRef idx="2">
-            <a:schemeClr val="dk1"/>
-          </a:lnRef>
-          <a:fillRef idx="1">
-            <a:schemeClr val="lt1"/>
-          </a:fillRef>
-          <a:effectRef idx="0">
-            <a:schemeClr val="dk1"/>
-          </a:effectRef>
-          <a:fontRef idx="minor">
-            <a:schemeClr val="dk1"/>
-          </a:fontRef>
-        </p:style>
-        <p:txBody>
-          <a:bodyPr rtlCol="0" anchor="ctr"/>
+            <a:scrgbClr r="0" g="0" b="0"/>
+          </a:fillRef>
+          <a:effectRef idx="0">
+            <a:scrgbClr r="0" g="0" b="0"/>
+          </a:effectRef>
+          <a:fontRef idx="minor">
+            <a:schemeClr val="dk1"/>
+          </a:fontRef>
+        </p:style>
+        <p:txBody>
+          <a:bodyPr rtlCol="0" anchor="t"/>
           <a:lstStyle/>
           <a:p>
             <a:pPr algn="ctr"/>
             <a:r>
-              <a:rPr lang="es-ES" sz="1400" dirty="0"/>
-              <a:t>1K</a:t>
-            </a:r>
-          </a:p>
-        </p:txBody>
-      </p:sp>
-      <p:sp>
-        <p:nvSpPr>
-          <p:cNvPr id="122" name="Rectángulo 121">
-            <a:extLst>
-              <a:ext uri="{FF2B5EF4-FFF2-40B4-BE49-F238E27FC236}">
-                <a16:creationId xmlns:a16="http://schemas.microsoft.com/office/drawing/2014/main" id="{4611A8CF-6DB8-F4B5-7EA2-CCAAF51603D7}"/>
-              </a:ext>
-            </a:extLst>
-          </p:cNvPr>
-          <p:cNvSpPr/>
-          <p:nvPr/>
-        </p:nvSpPr>
-        <p:spPr>
-          <a:xfrm rot="16200000">
-            <a:off x="2659588" y="5665822"/>
-            <a:ext cx="473121" cy="162388"/>
-          </a:xfrm>
-          <a:prstGeom prst="rect">
-            <a:avLst/>
-          </a:prstGeom>
-        </p:spPr>
-        <p:style>
-          <a:lnRef idx="2">
-            <a:schemeClr val="dk1"/>
-          </a:lnRef>
-          <a:fillRef idx="1">
-            <a:schemeClr val="lt1"/>
-          </a:fillRef>
-          <a:effectRef idx="0">
-            <a:schemeClr val="dk1"/>
-          </a:effectRef>
-          <a:fontRef idx="minor">
-            <a:schemeClr val="dk1"/>
-          </a:fontRef>
-        </p:style>
-        <p:txBody>
-          <a:bodyPr rtlCol="0" anchor="ctr"/>
-          <a:lstStyle/>
-          <a:p>
-            <a:pPr algn="ctr"/>
-            <a:r>
-              <a:rPr lang="es-ES" sz="1400" dirty="0"/>
-              <a:t>1K</a:t>
-            </a:r>
-          </a:p>
-        </p:txBody>
-      </p:sp>
-      <p:sp>
-        <p:nvSpPr>
-          <p:cNvPr id="123" name="Rectángulo 122">
-            <a:extLst>
-              <a:ext uri="{FF2B5EF4-FFF2-40B4-BE49-F238E27FC236}">
-                <a16:creationId xmlns:a16="http://schemas.microsoft.com/office/drawing/2014/main" id="{F8CCD1D0-7617-3E8B-38DA-53B90274596F}"/>
-              </a:ext>
-            </a:extLst>
-          </p:cNvPr>
-          <p:cNvSpPr/>
-          <p:nvPr/>
-        </p:nvSpPr>
-        <p:spPr>
-          <a:xfrm rot="16200000">
-            <a:off x="3022001" y="5686168"/>
-            <a:ext cx="473121" cy="162388"/>
-          </a:xfrm>
-          <a:prstGeom prst="rect">
-            <a:avLst/>
-          </a:prstGeom>
-        </p:spPr>
-        <p:style>
-          <a:lnRef idx="2">
-            <a:schemeClr val="dk1"/>
-          </a:lnRef>
-          <a:fillRef idx="1">
-            <a:schemeClr val="lt1"/>
-          </a:fillRef>
-          <a:effectRef idx="0">
-            <a:schemeClr val="dk1"/>
-          </a:effectRef>
-          <a:fontRef idx="minor">
-            <a:schemeClr val="dk1"/>
-          </a:fontRef>
-        </p:style>
-        <p:txBody>
-          <a:bodyPr rtlCol="0" anchor="ctr"/>
-          <a:lstStyle/>
-          <a:p>
-            <a:pPr algn="ctr"/>
-            <a:r>
-              <a:rPr lang="es-ES" sz="1400" dirty="0"/>
-              <a:t>1K</a:t>
-            </a:r>
-          </a:p>
-        </p:txBody>
-      </p:sp>
-      <p:sp>
-        <p:nvSpPr>
-          <p:cNvPr id="125" name="Rectángulo 124">
-            <a:extLst>
-              <a:ext uri="{FF2B5EF4-FFF2-40B4-BE49-F238E27FC236}">
-                <a16:creationId xmlns:a16="http://schemas.microsoft.com/office/drawing/2014/main" id="{A1946E26-4604-4483-76C1-5E7EDA158C8C}"/>
-              </a:ext>
-            </a:extLst>
-          </p:cNvPr>
-          <p:cNvSpPr/>
-          <p:nvPr/>
-        </p:nvSpPr>
-        <p:spPr>
-          <a:xfrm rot="16200000">
-            <a:off x="3403450" y="5656295"/>
-            <a:ext cx="473121" cy="162388"/>
-          </a:xfrm>
-          <a:prstGeom prst="rect">
-            <a:avLst/>
-          </a:prstGeom>
-        </p:spPr>
-        <p:style>
-          <a:lnRef idx="2">
-            <a:schemeClr val="dk1"/>
-          </a:lnRef>
-          <a:fillRef idx="1">
-            <a:schemeClr val="lt1"/>
-          </a:fillRef>
-          <a:effectRef idx="0">
-            <a:schemeClr val="dk1"/>
-          </a:effectRef>
-          <a:fontRef idx="minor">
-            <a:schemeClr val="dk1"/>
-          </a:fontRef>
-        </p:style>
-        <p:txBody>
-          <a:bodyPr rtlCol="0" anchor="ctr"/>
-          <a:lstStyle/>
-          <a:p>
-            <a:pPr algn="ctr"/>
-            <a:r>
-              <a:rPr lang="es-ES" sz="1400" dirty="0"/>
-              <a:t>1K</a:t>
+              <a:rPr lang="es-ES" sz="1200" dirty="0"/>
+              <a:t>Invernadero</a:t>
             </a:r>
           </a:p>
         </p:txBody>
@@ -15506,6 +16904,110 @@
       </p:grpSpPr>
       <p:sp>
         <p:nvSpPr>
+          <p:cNvPr id="7" name="Rectángulo 6">
+            <a:extLst>
+              <a:ext uri="{FF2B5EF4-FFF2-40B4-BE49-F238E27FC236}">
+                <a16:creationId xmlns:a16="http://schemas.microsoft.com/office/drawing/2014/main" id="{0D5681DB-44C7-2109-EB7B-F7FC4257C4E4}"/>
+              </a:ext>
+            </a:extLst>
+          </p:cNvPr>
+          <p:cNvSpPr/>
+          <p:nvPr/>
+        </p:nvSpPr>
+        <p:spPr>
+          <a:xfrm>
+            <a:off x="374347" y="3785518"/>
+            <a:ext cx="1707460" cy="1999591"/>
+          </a:xfrm>
+          <a:prstGeom prst="rect">
+            <a:avLst/>
+          </a:prstGeom>
+        </p:spPr>
+        <p:style>
+          <a:lnRef idx="2">
+            <a:schemeClr val="dk1"/>
+          </a:lnRef>
+          <a:fillRef idx="1">
+            <a:schemeClr val="lt1"/>
+          </a:fillRef>
+          <a:effectRef idx="0">
+            <a:schemeClr val="dk1"/>
+          </a:effectRef>
+          <a:fontRef idx="minor">
+            <a:schemeClr val="dk1"/>
+          </a:fontRef>
+        </p:style>
+        <p:txBody>
+          <a:bodyPr rtlCol="0" anchor="t"/>
+          <a:lstStyle/>
+          <a:p>
+            <a:r>
+              <a:rPr lang="es-ES" sz="1200" dirty="0"/>
+              <a:t>Muestrear Botonera</a:t>
+            </a:r>
+          </a:p>
+          <a:p>
+            <a:r>
+              <a:rPr lang="es-ES" sz="1200" dirty="0"/>
+              <a:t>Si tecla pulsada:</a:t>
+            </a:r>
+          </a:p>
+          <a:p>
+            <a:r>
+              <a:rPr lang="es-ES" sz="1200" dirty="0"/>
+              <a:t>  Inicio Interacción H-M  </a:t>
+            </a:r>
+          </a:p>
+        </p:txBody>
+      </p:sp>
+      <p:sp>
+        <p:nvSpPr>
+          <p:cNvPr id="5" name="Rectángulo 4">
+            <a:extLst>
+              <a:ext uri="{FF2B5EF4-FFF2-40B4-BE49-F238E27FC236}">
+                <a16:creationId xmlns:a16="http://schemas.microsoft.com/office/drawing/2014/main" id="{B81A65C0-ED26-BA80-C6B6-0B79D94B0882}"/>
+              </a:ext>
+            </a:extLst>
+          </p:cNvPr>
+          <p:cNvSpPr/>
+          <p:nvPr/>
+        </p:nvSpPr>
+        <p:spPr>
+          <a:xfrm>
+            <a:off x="639198" y="744067"/>
+            <a:ext cx="1707460" cy="2076710"/>
+          </a:xfrm>
+          <a:prstGeom prst="rect">
+            <a:avLst/>
+          </a:prstGeom>
+        </p:spPr>
+        <p:style>
+          <a:lnRef idx="2">
+            <a:schemeClr val="dk1"/>
+          </a:lnRef>
+          <a:fillRef idx="1">
+            <a:schemeClr val="lt1"/>
+          </a:fillRef>
+          <a:effectRef idx="0">
+            <a:schemeClr val="dk1"/>
+          </a:effectRef>
+          <a:fontRef idx="minor">
+            <a:schemeClr val="dk1"/>
+          </a:fontRef>
+        </p:style>
+        <p:txBody>
+          <a:bodyPr rtlCol="0" anchor="t"/>
+          <a:lstStyle/>
+          <a:p>
+            <a:r>
+              <a:rPr lang="es-ES" sz="1200" dirty="0"/>
+              <a:t>Ejecuto Control</a:t>
+            </a:r>
+          </a:p>
+        </p:txBody>
+      </p:sp>
+      <p:sp>
+        <p:nvSpPr>
           <p:cNvPr id="2" name="Rectángulo 1">
             <a:extLst>
               <a:ext uri="{FF2B5EF4-FFF2-40B4-BE49-F238E27FC236}">
@@ -15564,7 +17066,7 @@
           <a:p>
             <a:r>
               <a:rPr lang="es-ES" sz="1100" dirty="0"/>
-              <a:t>Ejecutar</a:t>
+              <a:t>Ejecutar()</a:t>
             </a:r>
           </a:p>
           <a:p>
@@ -15790,6 +17292,24 @@
               <a:t>UI</a:t>
             </a:r>
           </a:p>
+          <a:p>
+            <a:r>
+              <a:rPr lang="es-ES" sz="1100" dirty="0" err="1"/>
+              <a:t>Void</a:t>
+            </a:r>
+            <a:r>
+              <a:rPr lang="es-ES" sz="1100" dirty="0"/>
+              <a:t> </a:t>
+            </a:r>
+            <a:r>
+              <a:rPr lang="es-ES" sz="1100" dirty="0" err="1"/>
+              <a:t>DisplayInit</a:t>
+            </a:r>
+            <a:r>
+              <a:rPr lang="es-ES" sz="1100" dirty="0"/>
+              <a:t>()</a:t>
+            </a:r>
+          </a:p>
         </p:txBody>
       </p:sp>
       <p:sp>
@@ -15841,12 +17361,8 @@
           </a:p>
           <a:p>
             <a:r>
-              <a:rPr lang="es-ES" sz="1100" dirty="0" err="1"/>
-              <a:t>EncenderLED</a:t>
-            </a:r>
-            <a:r>
-              <a:rPr lang="es-ES" sz="1100" dirty="0"/>
-              <a:t>(</a:t>
+              <a:rPr lang="es-ES" sz="1100"/>
+              <a:t>EncenderLed(</a:t>
             </a:r>
             <a:r>
               <a:rPr lang="es-ES" sz="1100" dirty="0" err="1"/>
@@ -15860,7 +17376,7 @@
           <a:p>
             <a:r>
               <a:rPr lang="es-ES" sz="1100" dirty="0" err="1"/>
-              <a:t>Enum</a:t>
+              <a:t>tecla_t</a:t>
             </a:r>
             <a:r>
               <a:rPr lang="es-ES" sz="1100" dirty="0"/>
@@ -15868,17 +17384,12 @@
             </a:r>
             <a:r>
               <a:rPr lang="es-ES" sz="1100" dirty="0" err="1"/>
-              <a:t>Tecla_t</a:t>
+              <a:t>MuestrearBotonera</a:t>
             </a:r>
             <a:r>
               <a:rPr lang="es-ES" sz="1100" dirty="0"/>
-              <a:t> </a:t>
-            </a:r>
-            <a:r>
-              <a:rPr lang="es-ES" sz="1100" dirty="0" err="1"/>
-              <a:t>TeclaPulsada</a:t>
-            </a:r>
-            <a:endParaRPr lang="es-ES" sz="1100" dirty="0"/>
+              <a:t>()</a:t>
+            </a:r>
           </a:p>
         </p:txBody>
       </p:sp>

</xml_diff>